<commit_message>
updated readme, added to ask about mood after hi
</commit_message>
<xml_diff>
--- a/Rasa_Bot/Readme_Images/Prototype_Interaction.pptx
+++ b/Rasa_Bot/Readme_Images/Prototype_Interaction.pptx
@@ -262,7 +262,7 @@
           <a:p>
             <a:fld id="{ED9CCB52-56FE-42E5-B0D4-D20410F16FFD}" type="datetimeFigureOut">
               <a:rPr lang="LID4096" smtClean="0"/>
-              <a:t>05/07/2021</a:t>
+              <a:t>05/10/2021</a:t>
             </a:fld>
             <a:endParaRPr lang="LID4096"/>
           </a:p>
@@ -462,7 +462,7 @@
           <a:p>
             <a:fld id="{ED9CCB52-56FE-42E5-B0D4-D20410F16FFD}" type="datetimeFigureOut">
               <a:rPr lang="LID4096" smtClean="0"/>
-              <a:t>05/07/2021</a:t>
+              <a:t>05/10/2021</a:t>
             </a:fld>
             <a:endParaRPr lang="LID4096"/>
           </a:p>
@@ -672,7 +672,7 @@
           <a:p>
             <a:fld id="{ED9CCB52-56FE-42E5-B0D4-D20410F16FFD}" type="datetimeFigureOut">
               <a:rPr lang="LID4096" smtClean="0"/>
-              <a:t>05/07/2021</a:t>
+              <a:t>05/10/2021</a:t>
             </a:fld>
             <a:endParaRPr lang="LID4096"/>
           </a:p>
@@ -872,7 +872,7 @@
           <a:p>
             <a:fld id="{ED9CCB52-56FE-42E5-B0D4-D20410F16FFD}" type="datetimeFigureOut">
               <a:rPr lang="LID4096" smtClean="0"/>
-              <a:t>05/07/2021</a:t>
+              <a:t>05/10/2021</a:t>
             </a:fld>
             <a:endParaRPr lang="LID4096"/>
           </a:p>
@@ -1148,7 +1148,7 @@
           <a:p>
             <a:fld id="{ED9CCB52-56FE-42E5-B0D4-D20410F16FFD}" type="datetimeFigureOut">
               <a:rPr lang="LID4096" smtClean="0"/>
-              <a:t>05/07/2021</a:t>
+              <a:t>05/10/2021</a:t>
             </a:fld>
             <a:endParaRPr lang="LID4096"/>
           </a:p>
@@ -1416,7 +1416,7 @@
           <a:p>
             <a:fld id="{ED9CCB52-56FE-42E5-B0D4-D20410F16FFD}" type="datetimeFigureOut">
               <a:rPr lang="LID4096" smtClean="0"/>
-              <a:t>05/07/2021</a:t>
+              <a:t>05/10/2021</a:t>
             </a:fld>
             <a:endParaRPr lang="LID4096"/>
           </a:p>
@@ -1831,7 +1831,7 @@
           <a:p>
             <a:fld id="{ED9CCB52-56FE-42E5-B0D4-D20410F16FFD}" type="datetimeFigureOut">
               <a:rPr lang="LID4096" smtClean="0"/>
-              <a:t>05/07/2021</a:t>
+              <a:t>05/10/2021</a:t>
             </a:fld>
             <a:endParaRPr lang="LID4096"/>
           </a:p>
@@ -1973,7 +1973,7 @@
           <a:p>
             <a:fld id="{ED9CCB52-56FE-42E5-B0D4-D20410F16FFD}" type="datetimeFigureOut">
               <a:rPr lang="LID4096" smtClean="0"/>
-              <a:t>05/07/2021</a:t>
+              <a:t>05/10/2021</a:t>
             </a:fld>
             <a:endParaRPr lang="LID4096"/>
           </a:p>
@@ -2086,7 +2086,7 @@
           <a:p>
             <a:fld id="{ED9CCB52-56FE-42E5-B0D4-D20410F16FFD}" type="datetimeFigureOut">
               <a:rPr lang="LID4096" smtClean="0"/>
-              <a:t>05/07/2021</a:t>
+              <a:t>05/10/2021</a:t>
             </a:fld>
             <a:endParaRPr lang="LID4096"/>
           </a:p>
@@ -2399,7 +2399,7 @@
           <a:p>
             <a:fld id="{ED9CCB52-56FE-42E5-B0D4-D20410F16FFD}" type="datetimeFigureOut">
               <a:rPr lang="LID4096" smtClean="0"/>
-              <a:t>05/07/2021</a:t>
+              <a:t>05/10/2021</a:t>
             </a:fld>
             <a:endParaRPr lang="LID4096"/>
           </a:p>
@@ -2688,7 +2688,7 @@
           <a:p>
             <a:fld id="{ED9CCB52-56FE-42E5-B0D4-D20410F16FFD}" type="datetimeFigureOut">
               <a:rPr lang="LID4096" smtClean="0"/>
-              <a:t>05/07/2021</a:t>
+              <a:t>05/10/2021</a:t>
             </a:fld>
             <a:endParaRPr lang="LID4096"/>
           </a:p>
@@ -2931,7 +2931,7 @@
           <a:p>
             <a:fld id="{ED9CCB52-56FE-42E5-B0D4-D20410F16FFD}" type="datetimeFigureOut">
               <a:rPr lang="LID4096" smtClean="0"/>
-              <a:t>05/07/2021</a:t>
+              <a:t>05/10/2021</a:t>
             </a:fld>
             <a:endParaRPr lang="LID4096"/>
           </a:p>
@@ -3362,8 +3362,8 @@
         </p:nvSpPr>
         <p:spPr>
           <a:xfrm>
-            <a:off x="752019" y="855555"/>
-            <a:ext cx="2457974" cy="485048"/>
+            <a:off x="713066" y="855555"/>
+            <a:ext cx="2496927" cy="485048"/>
           </a:xfrm>
           <a:prstGeom prst="flowChartProcess">
             <a:avLst/>
@@ -3511,7 +3511,7 @@
         </p:nvSpPr>
         <p:spPr>
           <a:xfrm>
-            <a:off x="9152389" y="577443"/>
+            <a:off x="9152389" y="820724"/>
             <a:ext cx="374904" cy="377504"/>
           </a:xfrm>
           <a:prstGeom prst="flowChartConnector">
@@ -3560,7 +3560,7 @@
         </p:nvSpPr>
         <p:spPr>
           <a:xfrm>
-            <a:off x="9559451" y="577443"/>
+            <a:off x="9559451" y="820724"/>
             <a:ext cx="1682189" cy="369332"/>
           </a:xfrm>
           <a:prstGeom prst="rect">
@@ -3596,7 +3596,7 @@
         </p:nvSpPr>
         <p:spPr>
           <a:xfrm>
-            <a:off x="9152389" y="1032238"/>
+            <a:off x="9152389" y="1275519"/>
             <a:ext cx="374904" cy="377504"/>
           </a:xfrm>
           <a:prstGeom prst="flowChartConnector">
@@ -3642,7 +3642,7 @@
         </p:nvSpPr>
         <p:spPr>
           <a:xfrm>
-            <a:off x="9559451" y="1032238"/>
+            <a:off x="9559451" y="1275519"/>
             <a:ext cx="1682189" cy="369332"/>
           </a:xfrm>
           <a:prstGeom prst="rect">
@@ -3969,7 +3969,7 @@
         </p:nvSpPr>
         <p:spPr>
           <a:xfrm>
-            <a:off x="9152389" y="1487033"/>
+            <a:off x="9152389" y="1730314"/>
             <a:ext cx="374904" cy="377504"/>
           </a:xfrm>
           <a:prstGeom prst="flowChartConnector">
@@ -4015,7 +4015,7 @@
         </p:nvSpPr>
         <p:spPr>
           <a:xfrm>
-            <a:off x="9559451" y="1495205"/>
+            <a:off x="9559451" y="1738486"/>
             <a:ext cx="1682189" cy="646331"/>
           </a:xfrm>
           <a:prstGeom prst="rect">
@@ -4784,7 +4784,7 @@
         </p:nvSpPr>
         <p:spPr>
           <a:xfrm>
-            <a:off x="9152389" y="2317554"/>
+            <a:off x="9152389" y="2235171"/>
             <a:ext cx="374904" cy="377504"/>
           </a:xfrm>
           <a:prstGeom prst="flowChartConnector">
@@ -4830,7 +4830,7 @@
         </p:nvSpPr>
         <p:spPr>
           <a:xfrm>
-            <a:off x="9559451" y="2296588"/>
+            <a:off x="9559451" y="2235171"/>
             <a:ext cx="1682189" cy="369332"/>
           </a:xfrm>
           <a:prstGeom prst="rect">

</xml_diff>

<commit_message>
make greeting a story
</commit_message>
<xml_diff>
--- a/Rasa_Bot/Readme_Images/Prototype_Interaction.pptx
+++ b/Rasa_Bot/Readme_Images/Prototype_Interaction.pptx
@@ -7,6 +7,7 @@
   <p:sldIdLst>
     <p:sldId id="256" r:id="rId2"/>
     <p:sldId id="257" r:id="rId3"/>
+    <p:sldId id="258" r:id="rId4"/>
   </p:sldIdLst>
   <p:sldSz cx="12192000" cy="6858000"/>
   <p:notesSz cx="6858000" cy="9144000"/>
@@ -3350,10 +3351,10 @@
       </p:grpSpPr>
       <p:sp>
         <p:nvSpPr>
-          <p:cNvPr id="12" name="Flowchart: Process 11">
-            <a:extLst>
-              <a:ext uri="{FF2B5EF4-FFF2-40B4-BE49-F238E27FC236}">
-                <a16:creationId xmlns:a16="http://schemas.microsoft.com/office/drawing/2014/main" id="{481D3CB6-D7FE-44CB-BDF1-8145AE9231C5}"/>
+          <p:cNvPr id="2" name="Flowchart: Connector 1">
+            <a:extLst>
+              <a:ext uri="{FF2B5EF4-FFF2-40B4-BE49-F238E27FC236}">
+                <a16:creationId xmlns:a16="http://schemas.microsoft.com/office/drawing/2014/main" id="{39C137E3-2186-4534-AB72-9AE18B65D4C3}"/>
               </a:ext>
             </a:extLst>
           </p:cNvPr>
@@ -3362,10 +3363,10 @@
         </p:nvSpPr>
         <p:spPr>
           <a:xfrm>
-            <a:off x="713066" y="855555"/>
-            <a:ext cx="2496927" cy="485048"/>
-          </a:xfrm>
-          <a:prstGeom prst="flowChartProcess">
+            <a:off x="9177556" y="2734695"/>
+            <a:ext cx="374904" cy="377504"/>
+          </a:xfrm>
+          <a:prstGeom prst="flowChartConnector">
             <a:avLst/>
           </a:prstGeom>
           <a:solidFill>
@@ -3393,9 +3394,41 @@
           <a:lstStyle/>
           <a:p>
             <a:pPr algn="ctr"/>
+            <a:endParaRPr lang="LID4096"/>
+          </a:p>
+        </p:txBody>
+      </p:sp>
+      <p:sp>
+        <p:nvSpPr>
+          <p:cNvPr id="3" name="TextBox 2">
+            <a:extLst>
+              <a:ext uri="{FF2B5EF4-FFF2-40B4-BE49-F238E27FC236}">
+                <a16:creationId xmlns:a16="http://schemas.microsoft.com/office/drawing/2014/main" id="{268DDD4A-7C05-43AF-96BE-452A3CC4617B}"/>
+              </a:ext>
+            </a:extLst>
+          </p:cNvPr>
+          <p:cNvSpPr txBox="1"/>
+          <p:nvPr/>
+        </p:nvSpPr>
+        <p:spPr>
+          <a:xfrm>
+            <a:off x="9584618" y="2734695"/>
+            <a:ext cx="1682189" cy="369332"/>
+          </a:xfrm>
+          <a:prstGeom prst="rect">
+            <a:avLst/>
+          </a:prstGeom>
+          <a:noFill/>
+        </p:spPr>
+        <p:txBody>
+          <a:bodyPr wrap="square" rtlCol="0">
+            <a:spAutoFit/>
+          </a:bodyPr>
+          <a:lstStyle/>
+          <a:p>
             <a:r>
               <a:rPr lang="en-US" dirty="0"/>
-              <a:t>“Hi”</a:t>
+              <a:t>User utterance</a:t>
             </a:r>
             <a:endParaRPr lang="LID4096" dirty="0"/>
           </a:p>
@@ -3403,10 +3436,10 @@
       </p:sp>
       <p:sp>
         <p:nvSpPr>
-          <p:cNvPr id="16" name="Flowchart: Process 15">
-            <a:extLst>
-              <a:ext uri="{FF2B5EF4-FFF2-40B4-BE49-F238E27FC236}">
-                <a16:creationId xmlns:a16="http://schemas.microsoft.com/office/drawing/2014/main" id="{1AC773F1-A454-4351-B55A-ACB157D0404C}"/>
+          <p:cNvPr id="29" name="Flowchart: Connector 28">
+            <a:extLst>
+              <a:ext uri="{FF2B5EF4-FFF2-40B4-BE49-F238E27FC236}">
+                <a16:creationId xmlns:a16="http://schemas.microsoft.com/office/drawing/2014/main" id="{A20641B0-30CC-4B76-A57E-6D6B819BC982}"/>
               </a:ext>
             </a:extLst>
           </p:cNvPr>
@@ -3415,10 +3448,10 @@
         </p:nvSpPr>
         <p:spPr>
           <a:xfrm>
-            <a:off x="4764948" y="1442906"/>
-            <a:ext cx="2457974" cy="485048"/>
-          </a:xfrm>
-          <a:prstGeom prst="flowChartProcess">
+            <a:off x="9177556" y="3189490"/>
+            <a:ext cx="374904" cy="377504"/>
+          </a:xfrm>
+          <a:prstGeom prst="flowChartConnector">
             <a:avLst/>
           </a:prstGeom>
         </p:spPr>
@@ -3443,66 +3476,51 @@
           <a:lstStyle/>
           <a:p>
             <a:pPr algn="ctr"/>
-            <a:r>
-              <a:rPr lang="en-US" dirty="0"/>
-              <a:t>“Hi {name}!”</a:t>
-            </a:r>
-            <a:endParaRPr lang="LID4096" dirty="0"/>
-          </a:p>
-        </p:txBody>
-      </p:sp>
-      <p:cxnSp>
-        <p:nvCxnSpPr>
-          <p:cNvPr id="45" name="Straight Arrow Connector 44">
-            <a:extLst>
-              <a:ext uri="{FF2B5EF4-FFF2-40B4-BE49-F238E27FC236}">
-                <a16:creationId xmlns:a16="http://schemas.microsoft.com/office/drawing/2014/main" id="{08B9078A-B501-44C0-9673-FB7786967608}"/>
-              </a:ext>
-            </a:extLst>
-          </p:cNvPr>
-          <p:cNvCxnSpPr>
-            <a:cxnSpLocks/>
-            <a:stCxn id="12" idx="3"/>
-            <a:endCxn id="54" idx="1"/>
-          </p:cNvCxnSpPr>
+            <a:endParaRPr lang="LID4096"/>
+          </a:p>
+        </p:txBody>
+      </p:sp>
+      <p:sp>
+        <p:nvSpPr>
+          <p:cNvPr id="30" name="TextBox 29">
+            <a:extLst>
+              <a:ext uri="{FF2B5EF4-FFF2-40B4-BE49-F238E27FC236}">
+                <a16:creationId xmlns:a16="http://schemas.microsoft.com/office/drawing/2014/main" id="{A6201598-5425-4A95-AF7C-DA9AE763E9E6}"/>
+              </a:ext>
+            </a:extLst>
+          </p:cNvPr>
+          <p:cNvSpPr txBox="1"/>
           <p:nvPr/>
-        </p:nvCxnSpPr>
-        <p:spPr>
-          <a:xfrm>
-            <a:off x="3209993" y="1098079"/>
-            <a:ext cx="1554955" cy="0"/>
-          </a:xfrm>
-          <a:prstGeom prst="straightConnector1">
+        </p:nvSpPr>
+        <p:spPr>
+          <a:xfrm>
+            <a:off x="9584618" y="3189490"/>
+            <a:ext cx="1682189" cy="369332"/>
+          </a:xfrm>
+          <a:prstGeom prst="rect">
             <a:avLst/>
           </a:prstGeom>
-          <a:ln w="38100">
-            <a:solidFill>
-              <a:schemeClr val="tx1"/>
-            </a:solidFill>
-            <a:tailEnd type="triangle"/>
-          </a:ln>
-        </p:spPr>
-        <p:style>
-          <a:lnRef idx="1">
-            <a:schemeClr val="accent1"/>
-          </a:lnRef>
-          <a:fillRef idx="0">
-            <a:schemeClr val="accent1"/>
-          </a:fillRef>
-          <a:effectRef idx="0">
-            <a:schemeClr val="accent1"/>
-          </a:effectRef>
-          <a:fontRef idx="minor">
-            <a:schemeClr val="tx1"/>
-          </a:fontRef>
-        </p:style>
-      </p:cxnSp>
-      <p:sp>
-        <p:nvSpPr>
-          <p:cNvPr id="2" name="Flowchart: Connector 1">
-            <a:extLst>
-              <a:ext uri="{FF2B5EF4-FFF2-40B4-BE49-F238E27FC236}">
-                <a16:creationId xmlns:a16="http://schemas.microsoft.com/office/drawing/2014/main" id="{39C137E3-2186-4534-AB72-9AE18B65D4C3}"/>
+          <a:noFill/>
+        </p:spPr>
+        <p:txBody>
+          <a:bodyPr wrap="square" rtlCol="0">
+            <a:spAutoFit/>
+          </a:bodyPr>
+          <a:lstStyle/>
+          <a:p>
+            <a:r>
+              <a:rPr lang="en-US" dirty="0"/>
+              <a:t>Agent utterance</a:t>
+            </a:r>
+          </a:p>
+        </p:txBody>
+      </p:sp>
+      <p:sp>
+        <p:nvSpPr>
+          <p:cNvPr id="44" name="Flowchart: Process 43">
+            <a:extLst>
+              <a:ext uri="{FF2B5EF4-FFF2-40B4-BE49-F238E27FC236}">
+                <a16:creationId xmlns:a16="http://schemas.microsoft.com/office/drawing/2014/main" id="{38B50169-FE23-4868-9AD7-6B415C959EC1}"/>
               </a:ext>
             </a:extLst>
           </p:cNvPr>
@@ -3511,10 +3529,10 @@
         </p:nvSpPr>
         <p:spPr>
           <a:xfrm>
-            <a:off x="9152389" y="820724"/>
-            <a:ext cx="374904" cy="377504"/>
-          </a:xfrm>
-          <a:prstGeom prst="flowChartConnector">
+            <a:off x="713066" y="2249647"/>
+            <a:ext cx="2457974" cy="485048"/>
+          </a:xfrm>
+          <a:prstGeom prst="flowChartProcess">
             <a:avLst/>
           </a:prstGeom>
           <a:solidFill>
@@ -3542,41 +3560,9 @@
           <a:lstStyle/>
           <a:p>
             <a:pPr algn="ctr"/>
-            <a:endParaRPr lang="LID4096"/>
-          </a:p>
-        </p:txBody>
-      </p:sp>
-      <p:sp>
-        <p:nvSpPr>
-          <p:cNvPr id="3" name="TextBox 2">
-            <a:extLst>
-              <a:ext uri="{FF2B5EF4-FFF2-40B4-BE49-F238E27FC236}">
-                <a16:creationId xmlns:a16="http://schemas.microsoft.com/office/drawing/2014/main" id="{268DDD4A-7C05-43AF-96BE-452A3CC4617B}"/>
-              </a:ext>
-            </a:extLst>
-          </p:cNvPr>
-          <p:cNvSpPr txBox="1"/>
-          <p:nvPr/>
-        </p:nvSpPr>
-        <p:spPr>
-          <a:xfrm>
-            <a:off x="9559451" y="820724"/>
-            <a:ext cx="1682189" cy="369332"/>
-          </a:xfrm>
-          <a:prstGeom prst="rect">
-            <a:avLst/>
-          </a:prstGeom>
-          <a:noFill/>
-        </p:spPr>
-        <p:txBody>
-          <a:bodyPr wrap="square" rtlCol="0">
-            <a:spAutoFit/>
-          </a:bodyPr>
-          <a:lstStyle/>
-          <a:p>
             <a:r>
               <a:rPr lang="en-US" dirty="0"/>
-              <a:t>User utterance</a:t>
+              <a:t>“Wie ben je?”</a:t>
             </a:r>
             <a:endParaRPr lang="LID4096" dirty="0"/>
           </a:p>
@@ -3584,10 +3570,10 @@
       </p:sp>
       <p:sp>
         <p:nvSpPr>
-          <p:cNvPr id="29" name="Flowchart: Connector 28">
-            <a:extLst>
-              <a:ext uri="{FF2B5EF4-FFF2-40B4-BE49-F238E27FC236}">
-                <a16:creationId xmlns:a16="http://schemas.microsoft.com/office/drawing/2014/main" id="{A20641B0-30CC-4B76-A57E-6D6B819BC982}"/>
+          <p:cNvPr id="46" name="Flowchart: Process 45">
+            <a:extLst>
+              <a:ext uri="{FF2B5EF4-FFF2-40B4-BE49-F238E27FC236}">
+                <a16:creationId xmlns:a16="http://schemas.microsoft.com/office/drawing/2014/main" id="{B9E440E9-005D-4336-8527-0153F2B39C24}"/>
               </a:ext>
             </a:extLst>
           </p:cNvPr>
@@ -3596,10 +3582,10 @@
         </p:nvSpPr>
         <p:spPr>
           <a:xfrm>
-            <a:off x="9152389" y="1275519"/>
-            <a:ext cx="374904" cy="377504"/>
-          </a:xfrm>
-          <a:prstGeom prst="flowChartConnector">
+            <a:off x="4764948" y="2249647"/>
+            <a:ext cx="2457974" cy="485048"/>
+          </a:xfrm>
+          <a:prstGeom prst="flowChartProcess">
             <a:avLst/>
           </a:prstGeom>
         </p:spPr>
@@ -3624,51 +3610,36 @@
           <a:lstStyle/>
           <a:p>
             <a:pPr algn="ctr"/>
-            <a:endParaRPr lang="LID4096"/>
-          </a:p>
-        </p:txBody>
-      </p:sp>
-      <p:sp>
-        <p:nvSpPr>
-          <p:cNvPr id="30" name="TextBox 29">
-            <a:extLst>
-              <a:ext uri="{FF2B5EF4-FFF2-40B4-BE49-F238E27FC236}">
-                <a16:creationId xmlns:a16="http://schemas.microsoft.com/office/drawing/2014/main" id="{A6201598-5425-4A95-AF7C-DA9AE763E9E6}"/>
-              </a:ext>
-            </a:extLst>
-          </p:cNvPr>
-          <p:cNvSpPr txBox="1"/>
-          <p:nvPr/>
-        </p:nvSpPr>
-        <p:spPr>
-          <a:xfrm>
-            <a:off x="9559451" y="1275519"/>
-            <a:ext cx="1682189" cy="369332"/>
-          </a:xfrm>
-          <a:prstGeom prst="rect">
-            <a:avLst/>
-          </a:prstGeom>
-          <a:noFill/>
-        </p:spPr>
-        <p:txBody>
-          <a:bodyPr wrap="square" rtlCol="0">
-            <a:spAutoFit/>
-          </a:bodyPr>
-          <a:lstStyle/>
-          <a:p>
             <a:r>
               <a:rPr lang="en-US" dirty="0"/>
-              <a:t>Agent utterance</a:t>
-            </a:r>
-          </a:p>
-        </p:txBody>
-      </p:sp>
-      <p:sp>
-        <p:nvSpPr>
-          <p:cNvPr id="44" name="Flowchart: Process 43">
-            <a:extLst>
-              <a:ext uri="{FF2B5EF4-FFF2-40B4-BE49-F238E27FC236}">
-                <a16:creationId xmlns:a16="http://schemas.microsoft.com/office/drawing/2014/main" id="{38B50169-FE23-4868-9AD7-6B415C959EC1}"/>
+              <a:t>“</a:t>
+            </a:r>
+            <a:r>
+              <a:rPr lang="en-US" dirty="0" err="1"/>
+              <a:t>Ik</a:t>
+            </a:r>
+            <a:r>
+              <a:rPr lang="en-US" dirty="0"/>
+              <a:t> ben Kris, je </a:t>
+            </a:r>
+            <a:r>
+              <a:rPr lang="en-US" dirty="0" err="1"/>
+              <a:t>virtuele</a:t>
+            </a:r>
+            <a:r>
+              <a:rPr lang="en-US" dirty="0"/>
+              <a:t> coach.”</a:t>
+            </a:r>
+            <a:endParaRPr lang="LID4096" dirty="0"/>
+          </a:p>
+        </p:txBody>
+      </p:sp>
+      <p:sp>
+        <p:nvSpPr>
+          <p:cNvPr id="47" name="Flowchart: Process 46">
+            <a:extLst>
+              <a:ext uri="{FF2B5EF4-FFF2-40B4-BE49-F238E27FC236}">
+                <a16:creationId xmlns:a16="http://schemas.microsoft.com/office/drawing/2014/main" id="{67D87CC9-56FA-4263-BB16-230A428EA6D4}"/>
               </a:ext>
             </a:extLst>
           </p:cNvPr>
@@ -3677,15 +3648,12 @@
         </p:nvSpPr>
         <p:spPr>
           <a:xfrm>
-            <a:off x="713066" y="2249647"/>
-            <a:ext cx="2457974" cy="485048"/>
+            <a:off x="4764948" y="2813864"/>
+            <a:ext cx="2457974" cy="1187684"/>
           </a:xfrm>
           <a:prstGeom prst="flowChartProcess">
             <a:avLst/>
           </a:prstGeom>
-          <a:solidFill>
-            <a:srgbClr val="92D050"/>
-          </a:solidFill>
         </p:spPr>
         <p:style>
           <a:lnRef idx="2">
@@ -3710,7 +3678,11 @@
             <a:pPr algn="ctr"/>
             <a:r>
               <a:rPr lang="en-US" dirty="0"/>
-              <a:t>“Wie ben je?”</a:t>
+              <a:t>“</a:t>
+            </a:r>
+            <a:r>
+              <a:rPr lang="nl-NL" dirty="0"/>
+              <a:t>Ik ben hier om je te helpen stoppen met roken en lichamelijk actiever te worden.”</a:t>
             </a:r>
             <a:endParaRPr lang="LID4096" dirty="0"/>
           </a:p>
@@ -3718,10 +3690,10 @@
       </p:sp>
       <p:sp>
         <p:nvSpPr>
-          <p:cNvPr id="46" name="Flowchart: Process 45">
-            <a:extLst>
-              <a:ext uri="{FF2B5EF4-FFF2-40B4-BE49-F238E27FC236}">
-                <a16:creationId xmlns:a16="http://schemas.microsoft.com/office/drawing/2014/main" id="{B9E440E9-005D-4336-8527-0153F2B39C24}"/>
+          <p:cNvPr id="49" name="Flowchart: Process 48">
+            <a:extLst>
+              <a:ext uri="{FF2B5EF4-FFF2-40B4-BE49-F238E27FC236}">
+                <a16:creationId xmlns:a16="http://schemas.microsoft.com/office/drawing/2014/main" id="{77D617FF-1845-4CDA-B923-8EA15B7A0D1D}"/>
               </a:ext>
             </a:extLst>
           </p:cNvPr>
@@ -3730,12 +3702,15 @@
         </p:nvSpPr>
         <p:spPr>
           <a:xfrm>
-            <a:off x="4764948" y="2249647"/>
+            <a:off x="713066" y="4331515"/>
             <a:ext cx="2457974" cy="485048"/>
           </a:xfrm>
           <a:prstGeom prst="flowChartProcess">
             <a:avLst/>
           </a:prstGeom>
+          <a:solidFill>
+            <a:srgbClr val="92D050"/>
+          </a:solidFill>
         </p:spPr>
         <p:style>
           <a:lnRef idx="2">
@@ -3764,19 +3739,11 @@
             </a:r>
             <a:r>
               <a:rPr lang="en-US" dirty="0" err="1"/>
-              <a:t>Ik</a:t>
+              <a:t>Doei</a:t>
             </a:r>
             <a:r>
               <a:rPr lang="en-US" dirty="0"/>
-              <a:t> ben Kris, je </a:t>
-            </a:r>
-            <a:r>
-              <a:rPr lang="en-US" dirty="0" err="1"/>
-              <a:t>virtuele</a:t>
-            </a:r>
-            <a:r>
-              <a:rPr lang="en-US" dirty="0"/>
-              <a:t> coach.”</a:t>
+              <a:t>!”</a:t>
             </a:r>
             <a:endParaRPr lang="LID4096" dirty="0"/>
           </a:p>
@@ -3784,10 +3751,10 @@
       </p:sp>
       <p:sp>
         <p:nvSpPr>
-          <p:cNvPr id="47" name="Flowchart: Process 46">
-            <a:extLst>
-              <a:ext uri="{FF2B5EF4-FFF2-40B4-BE49-F238E27FC236}">
-                <a16:creationId xmlns:a16="http://schemas.microsoft.com/office/drawing/2014/main" id="{67D87CC9-56FA-4263-BB16-230A428EA6D4}"/>
+          <p:cNvPr id="50" name="Flowchart: Process 49">
+            <a:extLst>
+              <a:ext uri="{FF2B5EF4-FFF2-40B4-BE49-F238E27FC236}">
+                <a16:creationId xmlns:a16="http://schemas.microsoft.com/office/drawing/2014/main" id="{691820C6-1FB9-4BCA-98C1-FFCD95A59DB0}"/>
               </a:ext>
             </a:extLst>
           </p:cNvPr>
@@ -3796,8 +3763,8 @@
         </p:nvSpPr>
         <p:spPr>
           <a:xfrm>
-            <a:off x="4764948" y="2813864"/>
-            <a:ext cx="2457974" cy="1187684"/>
+            <a:off x="4764948" y="4331515"/>
+            <a:ext cx="2457974" cy="485048"/>
           </a:xfrm>
           <a:prstGeom prst="flowChartProcess">
             <a:avLst/>
@@ -3826,11 +3793,15 @@
             <a:pPr algn="ctr"/>
             <a:r>
               <a:rPr lang="en-US" dirty="0"/>
-              <a:t>“</a:t>
-            </a:r>
-            <a:r>
-              <a:rPr lang="nl-NL" dirty="0"/>
-              <a:t>Ik ben hier om je te helpen stoppen met roken en lichamelijk actiever te worden.”</a:t>
+              <a:t>“Tot </a:t>
+            </a:r>
+            <a:r>
+              <a:rPr lang="en-US" dirty="0" err="1"/>
+              <a:t>ziens</a:t>
+            </a:r>
+            <a:r>
+              <a:rPr lang="en-US" dirty="0"/>
+              <a:t>!”</a:t>
             </a:r>
             <a:endParaRPr lang="LID4096" dirty="0"/>
           </a:p>
@@ -3838,10 +3809,10 @@
       </p:sp>
       <p:sp>
         <p:nvSpPr>
-          <p:cNvPr id="49" name="Flowchart: Process 48">
-            <a:extLst>
-              <a:ext uri="{FF2B5EF4-FFF2-40B4-BE49-F238E27FC236}">
-                <a16:creationId xmlns:a16="http://schemas.microsoft.com/office/drawing/2014/main" id="{77D617FF-1845-4CDA-B923-8EA15B7A0D1D}"/>
+          <p:cNvPr id="52" name="Flowchart: Connector 51">
+            <a:extLst>
+              <a:ext uri="{FF2B5EF4-FFF2-40B4-BE49-F238E27FC236}">
+                <a16:creationId xmlns:a16="http://schemas.microsoft.com/office/drawing/2014/main" id="{835B890C-A587-4B23-8730-A411CD62B5A5}"/>
               </a:ext>
             </a:extLst>
           </p:cNvPr>
@@ -3850,126 +3821,7 @@
         </p:nvSpPr>
         <p:spPr>
           <a:xfrm>
-            <a:off x="713066" y="4331515"/>
-            <a:ext cx="2457974" cy="485048"/>
-          </a:xfrm>
-          <a:prstGeom prst="flowChartProcess">
-            <a:avLst/>
-          </a:prstGeom>
-          <a:solidFill>
-            <a:srgbClr val="92D050"/>
-          </a:solidFill>
-        </p:spPr>
-        <p:style>
-          <a:lnRef idx="2">
-            <a:schemeClr val="accent1">
-              <a:shade val="50000"/>
-            </a:schemeClr>
-          </a:lnRef>
-          <a:fillRef idx="1">
-            <a:schemeClr val="accent1"/>
-          </a:fillRef>
-          <a:effectRef idx="0">
-            <a:schemeClr val="accent1"/>
-          </a:effectRef>
-          <a:fontRef idx="minor">
-            <a:schemeClr val="lt1"/>
-          </a:fontRef>
-        </p:style>
-        <p:txBody>
-          <a:bodyPr rtlCol="0" anchor="ctr"/>
-          <a:lstStyle/>
-          <a:p>
-            <a:pPr algn="ctr"/>
-            <a:r>
-              <a:rPr lang="en-US" dirty="0"/>
-              <a:t>“</a:t>
-            </a:r>
-            <a:r>
-              <a:rPr lang="en-US" dirty="0" err="1"/>
-              <a:t>Doei</a:t>
-            </a:r>
-            <a:r>
-              <a:rPr lang="en-US" dirty="0"/>
-              <a:t>!”</a:t>
-            </a:r>
-            <a:endParaRPr lang="LID4096" dirty="0"/>
-          </a:p>
-        </p:txBody>
-      </p:sp>
-      <p:sp>
-        <p:nvSpPr>
-          <p:cNvPr id="50" name="Flowchart: Process 49">
-            <a:extLst>
-              <a:ext uri="{FF2B5EF4-FFF2-40B4-BE49-F238E27FC236}">
-                <a16:creationId xmlns:a16="http://schemas.microsoft.com/office/drawing/2014/main" id="{691820C6-1FB9-4BCA-98C1-FFCD95A59DB0}"/>
-              </a:ext>
-            </a:extLst>
-          </p:cNvPr>
-          <p:cNvSpPr/>
-          <p:nvPr/>
-        </p:nvSpPr>
-        <p:spPr>
-          <a:xfrm>
-            <a:off x="4764948" y="4331515"/>
-            <a:ext cx="2457974" cy="485048"/>
-          </a:xfrm>
-          <a:prstGeom prst="flowChartProcess">
-            <a:avLst/>
-          </a:prstGeom>
-        </p:spPr>
-        <p:style>
-          <a:lnRef idx="2">
-            <a:schemeClr val="accent1">
-              <a:shade val="50000"/>
-            </a:schemeClr>
-          </a:lnRef>
-          <a:fillRef idx="1">
-            <a:schemeClr val="accent1"/>
-          </a:fillRef>
-          <a:effectRef idx="0">
-            <a:schemeClr val="accent1"/>
-          </a:effectRef>
-          <a:fontRef idx="minor">
-            <a:schemeClr val="lt1"/>
-          </a:fontRef>
-        </p:style>
-        <p:txBody>
-          <a:bodyPr rtlCol="0" anchor="ctr"/>
-          <a:lstStyle/>
-          <a:p>
-            <a:pPr algn="ctr"/>
-            <a:r>
-              <a:rPr lang="en-US" dirty="0"/>
-              <a:t>“Tot </a:t>
-            </a:r>
-            <a:r>
-              <a:rPr lang="en-US" dirty="0" err="1"/>
-              <a:t>ziens</a:t>
-            </a:r>
-            <a:r>
-              <a:rPr lang="en-US" dirty="0"/>
-              <a:t>!”</a:t>
-            </a:r>
-            <a:endParaRPr lang="LID4096" dirty="0"/>
-          </a:p>
-        </p:txBody>
-      </p:sp>
-      <p:sp>
-        <p:nvSpPr>
-          <p:cNvPr id="52" name="Flowchart: Connector 51">
-            <a:extLst>
-              <a:ext uri="{FF2B5EF4-FFF2-40B4-BE49-F238E27FC236}">
-                <a16:creationId xmlns:a16="http://schemas.microsoft.com/office/drawing/2014/main" id="{835B890C-A587-4B23-8730-A411CD62B5A5}"/>
-              </a:ext>
-            </a:extLst>
-          </p:cNvPr>
-          <p:cNvSpPr/>
-          <p:nvPr/>
-        </p:nvSpPr>
-        <p:spPr>
-          <a:xfrm>
-            <a:off x="9152389" y="1730314"/>
+            <a:off x="9177556" y="3644285"/>
             <a:ext cx="374904" cy="377504"/>
           </a:xfrm>
           <a:prstGeom prst="flowChartConnector">
@@ -4015,7 +3867,7 @@
         </p:nvSpPr>
         <p:spPr>
           <a:xfrm>
-            <a:off x="9559451" y="1738486"/>
+            <a:off x="9584618" y="3652457"/>
             <a:ext cx="1682189" cy="646331"/>
           </a:xfrm>
           <a:prstGeom prst="rect">
@@ -4033,56 +3885,6 @@
               <a:rPr lang="en-US" dirty="0"/>
               <a:t>Custom action taken by agent</a:t>
             </a:r>
-          </a:p>
-        </p:txBody>
-      </p:sp>
-      <p:sp>
-        <p:nvSpPr>
-          <p:cNvPr id="54" name="Flowchart: Process 53">
-            <a:extLst>
-              <a:ext uri="{FF2B5EF4-FFF2-40B4-BE49-F238E27FC236}">
-                <a16:creationId xmlns:a16="http://schemas.microsoft.com/office/drawing/2014/main" id="{1E9E6782-8DAC-4482-8D7F-E2E004422940}"/>
-              </a:ext>
-            </a:extLst>
-          </p:cNvPr>
-          <p:cNvSpPr/>
-          <p:nvPr/>
-        </p:nvSpPr>
-        <p:spPr>
-          <a:xfrm>
-            <a:off x="4764948" y="855555"/>
-            <a:ext cx="2457974" cy="485048"/>
-          </a:xfrm>
-          <a:prstGeom prst="flowChartProcess">
-            <a:avLst/>
-          </a:prstGeom>
-        </p:spPr>
-        <p:style>
-          <a:lnRef idx="2">
-            <a:schemeClr val="accent3">
-              <a:shade val="50000"/>
-            </a:schemeClr>
-          </a:lnRef>
-          <a:fillRef idx="1">
-            <a:schemeClr val="accent3"/>
-          </a:fillRef>
-          <a:effectRef idx="0">
-            <a:schemeClr val="accent3"/>
-          </a:effectRef>
-          <a:fontRef idx="minor">
-            <a:schemeClr val="lt1"/>
-          </a:fontRef>
-        </p:style>
-        <p:txBody>
-          <a:bodyPr rtlCol="0" anchor="ctr"/>
-          <a:lstStyle/>
-          <a:p>
-            <a:pPr algn="ctr"/>
-            <a:r>
-              <a:rPr lang="en-US" i="1" dirty="0"/>
-              <a:t>Retrieve name from database</a:t>
-            </a:r>
-            <a:endParaRPr lang="LID4096" i="1" dirty="0"/>
           </a:p>
         </p:txBody>
       </p:sp>
@@ -4198,52 +4000,6 @@
           <a:xfrm>
             <a:off x="5993935" y="2734695"/>
             <a:ext cx="0" cy="79169"/>
-          </a:xfrm>
-          <a:prstGeom prst="straightConnector1">
-            <a:avLst/>
-          </a:prstGeom>
-          <a:ln w="38100">
-            <a:solidFill>
-              <a:schemeClr val="tx1"/>
-            </a:solidFill>
-            <a:tailEnd type="triangle"/>
-          </a:ln>
-        </p:spPr>
-        <p:style>
-          <a:lnRef idx="1">
-            <a:schemeClr val="accent1"/>
-          </a:lnRef>
-          <a:fillRef idx="0">
-            <a:schemeClr val="accent1"/>
-          </a:fillRef>
-          <a:effectRef idx="0">
-            <a:schemeClr val="accent1"/>
-          </a:effectRef>
-          <a:fontRef idx="minor">
-            <a:schemeClr val="tx1"/>
-          </a:fontRef>
-        </p:style>
-      </p:cxnSp>
-      <p:cxnSp>
-        <p:nvCxnSpPr>
-          <p:cNvPr id="75" name="Straight Arrow Connector 74">
-            <a:extLst>
-              <a:ext uri="{FF2B5EF4-FFF2-40B4-BE49-F238E27FC236}">
-                <a16:creationId xmlns:a16="http://schemas.microsoft.com/office/drawing/2014/main" id="{5050B848-8D5A-4196-9915-2D37CAC18935}"/>
-              </a:ext>
-            </a:extLst>
-          </p:cNvPr>
-          <p:cNvCxnSpPr>
-            <a:cxnSpLocks/>
-            <a:stCxn id="54" idx="2"/>
-            <a:endCxn id="16" idx="0"/>
-          </p:cNvCxnSpPr>
-          <p:nvPr/>
-        </p:nvCxnSpPr>
-        <p:spPr>
-          <a:xfrm>
-            <a:off x="5993935" y="1340603"/>
-            <a:ext cx="0" cy="102303"/>
           </a:xfrm>
           <a:prstGeom prst="straightConnector1">
             <a:avLst/>
@@ -4453,65 +4209,7 @@
             <a:pPr algn="ctr"/>
             <a:r>
               <a:rPr lang="en-US" dirty="0"/>
-              <a:t>“Hoe </a:t>
-            </a:r>
-            <a:r>
-              <a:rPr lang="en-US" dirty="0" err="1"/>
-              <a:t>gaat</a:t>
-            </a:r>
-            <a:r>
-              <a:rPr lang="en-US" dirty="0"/>
-              <a:t> het met je?”</a:t>
-            </a:r>
-            <a:endParaRPr lang="LID4096" dirty="0"/>
-          </a:p>
-        </p:txBody>
-      </p:sp>
-      <p:sp>
-        <p:nvSpPr>
-          <p:cNvPr id="8" name="Flowchart: Process 7">
-            <a:extLst>
-              <a:ext uri="{FF2B5EF4-FFF2-40B4-BE49-F238E27FC236}">
-                <a16:creationId xmlns:a16="http://schemas.microsoft.com/office/drawing/2014/main" id="{61100920-0E30-42FB-AFC6-875F961C3744}"/>
-              </a:ext>
-            </a:extLst>
-          </p:cNvPr>
-          <p:cNvSpPr/>
-          <p:nvPr/>
-        </p:nvSpPr>
-        <p:spPr>
-          <a:xfrm>
-            <a:off x="3535961" y="1048494"/>
-            <a:ext cx="2457974" cy="1388899"/>
-          </a:xfrm>
-          <a:prstGeom prst="flowChartProcess">
-            <a:avLst/>
-          </a:prstGeom>
-        </p:spPr>
-        <p:style>
-          <a:lnRef idx="2">
-            <a:schemeClr val="accent1">
-              <a:shade val="50000"/>
-            </a:schemeClr>
-          </a:lnRef>
-          <a:fillRef idx="1">
-            <a:schemeClr val="accent1"/>
-          </a:fillRef>
-          <a:effectRef idx="0">
-            <a:schemeClr val="accent1"/>
-          </a:effectRef>
-          <a:fontRef idx="minor">
-            <a:schemeClr val="lt1"/>
-          </a:fontRef>
-        </p:style>
-        <p:txBody>
-          <a:bodyPr rtlCol="0" anchor="ctr"/>
-          <a:lstStyle/>
-          <a:p>
-            <a:pPr algn="ctr"/>
-            <a:r>
-              <a:rPr lang="nl-NL" dirty="0"/>
-              <a:t>“Ik voel me geweldig. Ik vind het leuk om mensen te helpen gezonder te worden.”</a:t>
+              <a:t>“Hi”</a:t>
             </a:r>
             <a:endParaRPr lang="LID4096" dirty="0"/>
           </a:p>
@@ -4529,14 +4227,14 @@
           <p:cNvCxnSpPr>
             <a:cxnSpLocks/>
             <a:stCxn id="7" idx="2"/>
-            <a:endCxn id="8" idx="0"/>
+            <a:endCxn id="30" idx="0"/>
           </p:cNvCxnSpPr>
           <p:nvPr/>
         </p:nvCxnSpPr>
         <p:spPr>
           <a:xfrm>
             <a:off x="4764948" y="819967"/>
-            <a:ext cx="0" cy="228527"/>
+            <a:ext cx="0" cy="236580"/>
           </a:xfrm>
           <a:prstGeom prst="straightConnector1">
             <a:avLst/>
@@ -4607,23 +4305,15 @@
             <a:pPr algn="ctr"/>
             <a:r>
               <a:rPr lang="en-US" dirty="0"/>
-              <a:t>“</a:t>
+              <a:t>“Hoe </a:t>
             </a:r>
             <a:r>
               <a:rPr lang="en-US" dirty="0" err="1"/>
-              <a:t>En</a:t>
+              <a:t>gaat</a:t>
             </a:r>
             <a:r>
               <a:rPr lang="en-US" dirty="0"/>
-              <a:t> </a:t>
-            </a:r>
-            <a:r>
-              <a:rPr lang="en-US" dirty="0" err="1"/>
-              <a:t>jij</a:t>
-            </a:r>
-            <a:r>
-              <a:rPr lang="en-US" dirty="0"/>
-              <a:t>?”</a:t>
+              <a:t> het met je?”</a:t>
             </a:r>
             <a:endParaRPr lang="LID4096" dirty="0"/>
           </a:p>
@@ -5272,15 +4962,14 @@
           </p:cNvPr>
           <p:cNvCxnSpPr>
             <a:cxnSpLocks/>
-            <a:stCxn id="8" idx="2"/>
             <a:endCxn id="10" idx="0"/>
           </p:cNvCxnSpPr>
           <p:nvPr/>
         </p:nvCxnSpPr>
         <p:spPr>
           <a:xfrm>
-            <a:off x="4764948" y="2437393"/>
-            <a:ext cx="0" cy="228527"/>
+            <a:off x="4764948" y="2235171"/>
+            <a:ext cx="0" cy="430749"/>
           </a:xfrm>
           <a:prstGeom prst="straightConnector1">
             <a:avLst/>
@@ -5557,6 +5246,152 @@
           <a:xfrm>
             <a:off x="2306974" y="4905656"/>
             <a:ext cx="0" cy="228526"/>
+          </a:xfrm>
+          <a:prstGeom prst="straightConnector1">
+            <a:avLst/>
+          </a:prstGeom>
+          <a:ln w="38100">
+            <a:solidFill>
+              <a:schemeClr val="tx1"/>
+            </a:solidFill>
+            <a:tailEnd type="triangle"/>
+          </a:ln>
+        </p:spPr>
+        <p:style>
+          <a:lnRef idx="1">
+            <a:schemeClr val="accent1"/>
+          </a:lnRef>
+          <a:fillRef idx="0">
+            <a:schemeClr val="accent1"/>
+          </a:fillRef>
+          <a:effectRef idx="0">
+            <a:schemeClr val="accent1"/>
+          </a:effectRef>
+          <a:fontRef idx="minor">
+            <a:schemeClr val="tx1"/>
+          </a:fontRef>
+        </p:style>
+      </p:cxnSp>
+      <p:sp>
+        <p:nvSpPr>
+          <p:cNvPr id="29" name="Flowchart: Process 28">
+            <a:extLst>
+              <a:ext uri="{FF2B5EF4-FFF2-40B4-BE49-F238E27FC236}">
+                <a16:creationId xmlns:a16="http://schemas.microsoft.com/office/drawing/2014/main" id="{666C019E-0790-4BEB-B5CF-C7808A8CD6FE}"/>
+              </a:ext>
+            </a:extLst>
+          </p:cNvPr>
+          <p:cNvSpPr/>
+          <p:nvPr/>
+        </p:nvSpPr>
+        <p:spPr>
+          <a:xfrm>
+            <a:off x="3535961" y="1910343"/>
+            <a:ext cx="2457974" cy="485048"/>
+          </a:xfrm>
+          <a:prstGeom prst="flowChartProcess">
+            <a:avLst/>
+          </a:prstGeom>
+        </p:spPr>
+        <p:style>
+          <a:lnRef idx="2">
+            <a:schemeClr val="accent1">
+              <a:shade val="50000"/>
+            </a:schemeClr>
+          </a:lnRef>
+          <a:fillRef idx="1">
+            <a:schemeClr val="accent1"/>
+          </a:fillRef>
+          <a:effectRef idx="0">
+            <a:schemeClr val="accent1"/>
+          </a:effectRef>
+          <a:fontRef idx="minor">
+            <a:schemeClr val="lt1"/>
+          </a:fontRef>
+        </p:style>
+        <p:txBody>
+          <a:bodyPr rtlCol="0" anchor="ctr"/>
+          <a:lstStyle/>
+          <a:p>
+            <a:pPr algn="ctr"/>
+            <a:r>
+              <a:rPr lang="en-US" dirty="0"/>
+              <a:t>“Hi {name}!”</a:t>
+            </a:r>
+            <a:endParaRPr lang="LID4096" dirty="0"/>
+          </a:p>
+        </p:txBody>
+      </p:sp>
+      <p:sp>
+        <p:nvSpPr>
+          <p:cNvPr id="30" name="Flowchart: Process 29">
+            <a:extLst>
+              <a:ext uri="{FF2B5EF4-FFF2-40B4-BE49-F238E27FC236}">
+                <a16:creationId xmlns:a16="http://schemas.microsoft.com/office/drawing/2014/main" id="{FB3F9A38-AA99-4222-AFE4-39FA8C0D3914}"/>
+              </a:ext>
+            </a:extLst>
+          </p:cNvPr>
+          <p:cNvSpPr/>
+          <p:nvPr/>
+        </p:nvSpPr>
+        <p:spPr>
+          <a:xfrm>
+            <a:off x="3535961" y="1056547"/>
+            <a:ext cx="2457974" cy="611272"/>
+          </a:xfrm>
+          <a:prstGeom prst="flowChartProcess">
+            <a:avLst/>
+          </a:prstGeom>
+        </p:spPr>
+        <p:style>
+          <a:lnRef idx="2">
+            <a:schemeClr val="accent3">
+              <a:shade val="50000"/>
+            </a:schemeClr>
+          </a:lnRef>
+          <a:fillRef idx="1">
+            <a:schemeClr val="accent3"/>
+          </a:fillRef>
+          <a:effectRef idx="0">
+            <a:schemeClr val="accent3"/>
+          </a:effectRef>
+          <a:fontRef idx="minor">
+            <a:schemeClr val="lt1"/>
+          </a:fontRef>
+        </p:style>
+        <p:txBody>
+          <a:bodyPr rtlCol="0" anchor="ctr"/>
+          <a:lstStyle/>
+          <a:p>
+            <a:pPr algn="ctr"/>
+            <a:r>
+              <a:rPr lang="en-US" i="1" dirty="0"/>
+              <a:t>Retrieve name from database</a:t>
+            </a:r>
+            <a:endParaRPr lang="LID4096" i="1" dirty="0"/>
+          </a:p>
+        </p:txBody>
+      </p:sp>
+      <p:cxnSp>
+        <p:nvCxnSpPr>
+          <p:cNvPr id="32" name="Straight Arrow Connector 31">
+            <a:extLst>
+              <a:ext uri="{FF2B5EF4-FFF2-40B4-BE49-F238E27FC236}">
+                <a16:creationId xmlns:a16="http://schemas.microsoft.com/office/drawing/2014/main" id="{977A5B23-A75F-44F9-8977-EC1774CDDBD4}"/>
+              </a:ext>
+            </a:extLst>
+          </p:cNvPr>
+          <p:cNvCxnSpPr>
+            <a:cxnSpLocks/>
+            <a:stCxn id="30" idx="2"/>
+            <a:endCxn id="29" idx="0"/>
+          </p:cNvCxnSpPr>
+          <p:nvPr/>
+        </p:nvCxnSpPr>
+        <p:spPr>
+          <a:xfrm>
+            <a:off x="4764948" y="1667819"/>
+            <a:ext cx="0" cy="242524"/>
           </a:xfrm>
           <a:prstGeom prst="straightConnector1">
             <a:avLst/>
@@ -5587,6 +5422,1319 @@
     <p:extLst>
       <p:ext uri="{BB962C8B-B14F-4D97-AF65-F5344CB8AC3E}">
         <p14:creationId xmlns:p14="http://schemas.microsoft.com/office/powerpoint/2010/main" val="4040083971"/>
+      </p:ext>
+    </p:extLst>
+  </p:cSld>
+  <p:clrMapOvr>
+    <a:masterClrMapping/>
+  </p:clrMapOvr>
+</p:sld>
+</file>
+
+<file path=ppt/slides/slide3.xml><?xml version="1.0" encoding="utf-8"?>
+<p:sld xmlns:a="http://schemas.openxmlformats.org/drawingml/2006/main" xmlns:r="http://schemas.openxmlformats.org/officeDocument/2006/relationships" xmlns:p="http://schemas.openxmlformats.org/presentationml/2006/main">
+  <p:cSld>
+    <p:spTree>
+      <p:nvGrpSpPr>
+        <p:cNvPr id="1" name=""/>
+        <p:cNvGrpSpPr/>
+        <p:nvPr/>
+      </p:nvGrpSpPr>
+      <p:grpSpPr>
+        <a:xfrm>
+          <a:off x="0" y="0"/>
+          <a:ext cx="0" cy="0"/>
+          <a:chOff x="0" y="0"/>
+          <a:chExt cx="0" cy="0"/>
+        </a:xfrm>
+      </p:grpSpPr>
+      <p:sp>
+        <p:nvSpPr>
+          <p:cNvPr id="4" name="TextBox 3">
+            <a:extLst>
+              <a:ext uri="{FF2B5EF4-FFF2-40B4-BE49-F238E27FC236}">
+                <a16:creationId xmlns:a16="http://schemas.microsoft.com/office/drawing/2014/main" id="{D984F534-2C87-4CC1-B71E-B838ED7DFC0C}"/>
+              </a:ext>
+            </a:extLst>
+          </p:cNvPr>
+          <p:cNvSpPr txBox="1"/>
+          <p:nvPr/>
+        </p:nvSpPr>
+        <p:spPr>
+          <a:xfrm>
+            <a:off x="9559451" y="577443"/>
+            <a:ext cx="1682189" cy="369332"/>
+          </a:xfrm>
+          <a:prstGeom prst="rect">
+            <a:avLst/>
+          </a:prstGeom>
+          <a:noFill/>
+        </p:spPr>
+        <p:txBody>
+          <a:bodyPr wrap="square" rtlCol="0">
+            <a:spAutoFit/>
+          </a:bodyPr>
+          <a:lstStyle/>
+          <a:p>
+            <a:r>
+              <a:rPr lang="en-US" dirty="0"/>
+              <a:t>User utterance</a:t>
+            </a:r>
+            <a:endParaRPr lang="LID4096" dirty="0"/>
+          </a:p>
+        </p:txBody>
+      </p:sp>
+      <p:sp>
+        <p:nvSpPr>
+          <p:cNvPr id="5" name="TextBox 4">
+            <a:extLst>
+              <a:ext uri="{FF2B5EF4-FFF2-40B4-BE49-F238E27FC236}">
+                <a16:creationId xmlns:a16="http://schemas.microsoft.com/office/drawing/2014/main" id="{9845D8F7-9568-4732-ADAB-E40971148403}"/>
+              </a:ext>
+            </a:extLst>
+          </p:cNvPr>
+          <p:cNvSpPr txBox="1"/>
+          <p:nvPr/>
+        </p:nvSpPr>
+        <p:spPr>
+          <a:xfrm>
+            <a:off x="9559451" y="1032238"/>
+            <a:ext cx="1682189" cy="369332"/>
+          </a:xfrm>
+          <a:prstGeom prst="rect">
+            <a:avLst/>
+          </a:prstGeom>
+          <a:noFill/>
+        </p:spPr>
+        <p:txBody>
+          <a:bodyPr wrap="square" rtlCol="0">
+            <a:spAutoFit/>
+          </a:bodyPr>
+          <a:lstStyle/>
+          <a:p>
+            <a:r>
+              <a:rPr lang="en-US" dirty="0"/>
+              <a:t>Agent utterance</a:t>
+            </a:r>
+          </a:p>
+        </p:txBody>
+      </p:sp>
+      <p:sp>
+        <p:nvSpPr>
+          <p:cNvPr id="6" name="TextBox 5">
+            <a:extLst>
+              <a:ext uri="{FF2B5EF4-FFF2-40B4-BE49-F238E27FC236}">
+                <a16:creationId xmlns:a16="http://schemas.microsoft.com/office/drawing/2014/main" id="{4C6D785D-7D75-4DD1-908B-BBBA800DE1F1}"/>
+              </a:ext>
+            </a:extLst>
+          </p:cNvPr>
+          <p:cNvSpPr txBox="1"/>
+          <p:nvPr/>
+        </p:nvSpPr>
+        <p:spPr>
+          <a:xfrm>
+            <a:off x="9559451" y="1495205"/>
+            <a:ext cx="1682189" cy="646331"/>
+          </a:xfrm>
+          <a:prstGeom prst="rect">
+            <a:avLst/>
+          </a:prstGeom>
+          <a:noFill/>
+        </p:spPr>
+        <p:txBody>
+          <a:bodyPr wrap="square" rtlCol="0">
+            <a:spAutoFit/>
+          </a:bodyPr>
+          <a:lstStyle/>
+          <a:p>
+            <a:r>
+              <a:rPr lang="en-US" dirty="0"/>
+              <a:t>Custom action taken by agent</a:t>
+            </a:r>
+          </a:p>
+        </p:txBody>
+      </p:sp>
+      <p:sp>
+        <p:nvSpPr>
+          <p:cNvPr id="7" name="Flowchart: Process 6">
+            <a:extLst>
+              <a:ext uri="{FF2B5EF4-FFF2-40B4-BE49-F238E27FC236}">
+                <a16:creationId xmlns:a16="http://schemas.microsoft.com/office/drawing/2014/main" id="{B7786842-76BF-4D5B-8663-8A21F9814241}"/>
+              </a:ext>
+            </a:extLst>
+          </p:cNvPr>
+          <p:cNvSpPr/>
+          <p:nvPr/>
+        </p:nvSpPr>
+        <p:spPr>
+          <a:xfrm>
+            <a:off x="3535961" y="334919"/>
+            <a:ext cx="2457974" cy="485048"/>
+          </a:xfrm>
+          <a:prstGeom prst="flowChartProcess">
+            <a:avLst/>
+          </a:prstGeom>
+          <a:solidFill>
+            <a:srgbClr val="92D050"/>
+          </a:solidFill>
+        </p:spPr>
+        <p:style>
+          <a:lnRef idx="2">
+            <a:schemeClr val="accent1">
+              <a:shade val="50000"/>
+            </a:schemeClr>
+          </a:lnRef>
+          <a:fillRef idx="1">
+            <a:schemeClr val="accent1"/>
+          </a:fillRef>
+          <a:effectRef idx="0">
+            <a:schemeClr val="accent1"/>
+          </a:effectRef>
+          <a:fontRef idx="minor">
+            <a:schemeClr val="lt1"/>
+          </a:fontRef>
+        </p:style>
+        <p:txBody>
+          <a:bodyPr rtlCol="0" anchor="ctr"/>
+          <a:lstStyle/>
+          <a:p>
+            <a:pPr algn="ctr"/>
+            <a:r>
+              <a:rPr lang="en-US" dirty="0"/>
+              <a:t>“Hoe </a:t>
+            </a:r>
+            <a:r>
+              <a:rPr lang="en-US" dirty="0" err="1"/>
+              <a:t>gaat</a:t>
+            </a:r>
+            <a:r>
+              <a:rPr lang="en-US" dirty="0"/>
+              <a:t> het met je?”</a:t>
+            </a:r>
+            <a:endParaRPr lang="LID4096" dirty="0"/>
+          </a:p>
+        </p:txBody>
+      </p:sp>
+      <p:sp>
+        <p:nvSpPr>
+          <p:cNvPr id="8" name="Flowchart: Process 7">
+            <a:extLst>
+              <a:ext uri="{FF2B5EF4-FFF2-40B4-BE49-F238E27FC236}">
+                <a16:creationId xmlns:a16="http://schemas.microsoft.com/office/drawing/2014/main" id="{61100920-0E30-42FB-AFC6-875F961C3744}"/>
+              </a:ext>
+            </a:extLst>
+          </p:cNvPr>
+          <p:cNvSpPr/>
+          <p:nvPr/>
+        </p:nvSpPr>
+        <p:spPr>
+          <a:xfrm>
+            <a:off x="3535961" y="1048494"/>
+            <a:ext cx="2457974" cy="1388899"/>
+          </a:xfrm>
+          <a:prstGeom prst="flowChartProcess">
+            <a:avLst/>
+          </a:prstGeom>
+        </p:spPr>
+        <p:style>
+          <a:lnRef idx="2">
+            <a:schemeClr val="accent1">
+              <a:shade val="50000"/>
+            </a:schemeClr>
+          </a:lnRef>
+          <a:fillRef idx="1">
+            <a:schemeClr val="accent1"/>
+          </a:fillRef>
+          <a:effectRef idx="0">
+            <a:schemeClr val="accent1"/>
+          </a:effectRef>
+          <a:fontRef idx="minor">
+            <a:schemeClr val="lt1"/>
+          </a:fontRef>
+        </p:style>
+        <p:txBody>
+          <a:bodyPr rtlCol="0" anchor="ctr"/>
+          <a:lstStyle/>
+          <a:p>
+            <a:pPr algn="ctr"/>
+            <a:r>
+              <a:rPr lang="nl-NL" dirty="0"/>
+              <a:t>“Ik voel me geweldig. Ik vind het leuk om mensen te helpen gezonder te worden.”</a:t>
+            </a:r>
+            <a:endParaRPr lang="LID4096" dirty="0"/>
+          </a:p>
+        </p:txBody>
+      </p:sp>
+      <p:cxnSp>
+        <p:nvCxnSpPr>
+          <p:cNvPr id="9" name="Straight Arrow Connector 8">
+            <a:extLst>
+              <a:ext uri="{FF2B5EF4-FFF2-40B4-BE49-F238E27FC236}">
+                <a16:creationId xmlns:a16="http://schemas.microsoft.com/office/drawing/2014/main" id="{F86152A7-8F9F-4EB7-B4A2-63DD25505BAA}"/>
+              </a:ext>
+            </a:extLst>
+          </p:cNvPr>
+          <p:cNvCxnSpPr>
+            <a:cxnSpLocks/>
+            <a:stCxn id="7" idx="2"/>
+            <a:endCxn id="8" idx="0"/>
+          </p:cNvCxnSpPr>
+          <p:nvPr/>
+        </p:nvCxnSpPr>
+        <p:spPr>
+          <a:xfrm>
+            <a:off x="4764948" y="819967"/>
+            <a:ext cx="0" cy="228527"/>
+          </a:xfrm>
+          <a:prstGeom prst="straightConnector1">
+            <a:avLst/>
+          </a:prstGeom>
+          <a:ln w="38100">
+            <a:solidFill>
+              <a:schemeClr val="tx1"/>
+            </a:solidFill>
+            <a:tailEnd type="triangle"/>
+          </a:ln>
+        </p:spPr>
+        <p:style>
+          <a:lnRef idx="1">
+            <a:schemeClr val="accent1"/>
+          </a:lnRef>
+          <a:fillRef idx="0">
+            <a:schemeClr val="accent1"/>
+          </a:fillRef>
+          <a:effectRef idx="0">
+            <a:schemeClr val="accent1"/>
+          </a:effectRef>
+          <a:fontRef idx="minor">
+            <a:schemeClr val="tx1"/>
+          </a:fontRef>
+        </p:style>
+      </p:cxnSp>
+      <p:sp>
+        <p:nvSpPr>
+          <p:cNvPr id="10" name="Flowchart: Process 9">
+            <a:extLst>
+              <a:ext uri="{FF2B5EF4-FFF2-40B4-BE49-F238E27FC236}">
+                <a16:creationId xmlns:a16="http://schemas.microsoft.com/office/drawing/2014/main" id="{8378D6C7-5D59-40D2-9988-4CED38EEA5DC}"/>
+              </a:ext>
+            </a:extLst>
+          </p:cNvPr>
+          <p:cNvSpPr/>
+          <p:nvPr/>
+        </p:nvSpPr>
+        <p:spPr>
+          <a:xfrm>
+            <a:off x="3535961" y="2665920"/>
+            <a:ext cx="2457974" cy="485048"/>
+          </a:xfrm>
+          <a:prstGeom prst="flowChartProcess">
+            <a:avLst/>
+          </a:prstGeom>
+        </p:spPr>
+        <p:style>
+          <a:lnRef idx="2">
+            <a:schemeClr val="accent1">
+              <a:shade val="50000"/>
+            </a:schemeClr>
+          </a:lnRef>
+          <a:fillRef idx="1">
+            <a:schemeClr val="accent1"/>
+          </a:fillRef>
+          <a:effectRef idx="0">
+            <a:schemeClr val="accent1"/>
+          </a:effectRef>
+          <a:fontRef idx="minor">
+            <a:schemeClr val="lt1"/>
+          </a:fontRef>
+        </p:style>
+        <p:txBody>
+          <a:bodyPr rtlCol="0" anchor="ctr"/>
+          <a:lstStyle/>
+          <a:p>
+            <a:pPr algn="ctr"/>
+            <a:r>
+              <a:rPr lang="en-US" dirty="0"/>
+              <a:t>“</a:t>
+            </a:r>
+            <a:r>
+              <a:rPr lang="en-US" dirty="0" err="1"/>
+              <a:t>En</a:t>
+            </a:r>
+            <a:r>
+              <a:rPr lang="en-US" dirty="0"/>
+              <a:t> </a:t>
+            </a:r>
+            <a:r>
+              <a:rPr lang="en-US" dirty="0" err="1"/>
+              <a:t>jij</a:t>
+            </a:r>
+            <a:r>
+              <a:rPr lang="en-US" dirty="0"/>
+              <a:t>?”</a:t>
+            </a:r>
+            <a:endParaRPr lang="LID4096" dirty="0"/>
+          </a:p>
+        </p:txBody>
+      </p:sp>
+      <p:sp>
+        <p:nvSpPr>
+          <p:cNvPr id="11" name="Flowchart: Connector 10">
+            <a:extLst>
+              <a:ext uri="{FF2B5EF4-FFF2-40B4-BE49-F238E27FC236}">
+                <a16:creationId xmlns:a16="http://schemas.microsoft.com/office/drawing/2014/main" id="{CBBE398A-21AC-4228-9B58-15F1ACBE372C}"/>
+              </a:ext>
+            </a:extLst>
+          </p:cNvPr>
+          <p:cNvSpPr/>
+          <p:nvPr/>
+        </p:nvSpPr>
+        <p:spPr>
+          <a:xfrm>
+            <a:off x="9152389" y="577443"/>
+            <a:ext cx="374904" cy="377504"/>
+          </a:xfrm>
+          <a:prstGeom prst="flowChartConnector">
+            <a:avLst/>
+          </a:prstGeom>
+          <a:solidFill>
+            <a:srgbClr val="92D050"/>
+          </a:solidFill>
+        </p:spPr>
+        <p:style>
+          <a:lnRef idx="2">
+            <a:schemeClr val="accent1">
+              <a:shade val="50000"/>
+            </a:schemeClr>
+          </a:lnRef>
+          <a:fillRef idx="1">
+            <a:schemeClr val="accent1"/>
+          </a:fillRef>
+          <a:effectRef idx="0">
+            <a:schemeClr val="accent1"/>
+          </a:effectRef>
+          <a:fontRef idx="minor">
+            <a:schemeClr val="lt1"/>
+          </a:fontRef>
+        </p:style>
+        <p:txBody>
+          <a:bodyPr rtlCol="0" anchor="ctr"/>
+          <a:lstStyle/>
+          <a:p>
+            <a:pPr algn="ctr"/>
+            <a:endParaRPr lang="LID4096"/>
+          </a:p>
+        </p:txBody>
+      </p:sp>
+      <p:sp>
+        <p:nvSpPr>
+          <p:cNvPr id="12" name="Flowchart: Connector 11">
+            <a:extLst>
+              <a:ext uri="{FF2B5EF4-FFF2-40B4-BE49-F238E27FC236}">
+                <a16:creationId xmlns:a16="http://schemas.microsoft.com/office/drawing/2014/main" id="{73A6700D-CE36-4662-B1D0-6F5966727BFC}"/>
+              </a:ext>
+            </a:extLst>
+          </p:cNvPr>
+          <p:cNvSpPr/>
+          <p:nvPr/>
+        </p:nvSpPr>
+        <p:spPr>
+          <a:xfrm>
+            <a:off x="9152389" y="1032238"/>
+            <a:ext cx="374904" cy="377504"/>
+          </a:xfrm>
+          <a:prstGeom prst="flowChartConnector">
+            <a:avLst/>
+          </a:prstGeom>
+        </p:spPr>
+        <p:style>
+          <a:lnRef idx="2">
+            <a:schemeClr val="accent1">
+              <a:shade val="50000"/>
+            </a:schemeClr>
+          </a:lnRef>
+          <a:fillRef idx="1">
+            <a:schemeClr val="accent1"/>
+          </a:fillRef>
+          <a:effectRef idx="0">
+            <a:schemeClr val="accent1"/>
+          </a:effectRef>
+          <a:fontRef idx="minor">
+            <a:schemeClr val="lt1"/>
+          </a:fontRef>
+        </p:style>
+        <p:txBody>
+          <a:bodyPr rtlCol="0" anchor="ctr"/>
+          <a:lstStyle/>
+          <a:p>
+            <a:pPr algn="ctr"/>
+            <a:endParaRPr lang="LID4096"/>
+          </a:p>
+        </p:txBody>
+      </p:sp>
+      <p:sp>
+        <p:nvSpPr>
+          <p:cNvPr id="13" name="Flowchart: Connector 12">
+            <a:extLst>
+              <a:ext uri="{FF2B5EF4-FFF2-40B4-BE49-F238E27FC236}">
+                <a16:creationId xmlns:a16="http://schemas.microsoft.com/office/drawing/2014/main" id="{FBC95FB6-9AF4-4944-8213-34613B083B8C}"/>
+              </a:ext>
+            </a:extLst>
+          </p:cNvPr>
+          <p:cNvSpPr/>
+          <p:nvPr/>
+        </p:nvSpPr>
+        <p:spPr>
+          <a:xfrm>
+            <a:off x="9152389" y="1487033"/>
+            <a:ext cx="374904" cy="377504"/>
+          </a:xfrm>
+          <a:prstGeom prst="flowChartConnector">
+            <a:avLst/>
+          </a:prstGeom>
+        </p:spPr>
+        <p:style>
+          <a:lnRef idx="2">
+            <a:schemeClr val="accent3">
+              <a:shade val="50000"/>
+            </a:schemeClr>
+          </a:lnRef>
+          <a:fillRef idx="1">
+            <a:schemeClr val="accent3"/>
+          </a:fillRef>
+          <a:effectRef idx="0">
+            <a:schemeClr val="accent3"/>
+          </a:effectRef>
+          <a:fontRef idx="minor">
+            <a:schemeClr val="lt1"/>
+          </a:fontRef>
+        </p:style>
+        <p:txBody>
+          <a:bodyPr rtlCol="0" anchor="ctr"/>
+          <a:lstStyle/>
+          <a:p>
+            <a:pPr algn="ctr"/>
+            <a:endParaRPr lang="LID4096"/>
+          </a:p>
+        </p:txBody>
+      </p:sp>
+      <p:sp>
+        <p:nvSpPr>
+          <p:cNvPr id="20" name="Flowchart: Connector 19">
+            <a:extLst>
+              <a:ext uri="{FF2B5EF4-FFF2-40B4-BE49-F238E27FC236}">
+                <a16:creationId xmlns:a16="http://schemas.microsoft.com/office/drawing/2014/main" id="{5E6E6123-96BF-4926-9391-1A6AD08F9604}"/>
+              </a:ext>
+            </a:extLst>
+          </p:cNvPr>
+          <p:cNvSpPr/>
+          <p:nvPr/>
+        </p:nvSpPr>
+        <p:spPr>
+          <a:xfrm>
+            <a:off x="9152389" y="2235171"/>
+            <a:ext cx="374904" cy="377504"/>
+          </a:xfrm>
+          <a:prstGeom prst="flowChartConnector">
+            <a:avLst/>
+          </a:prstGeom>
+        </p:spPr>
+        <p:style>
+          <a:lnRef idx="2">
+            <a:schemeClr val="accent4">
+              <a:shade val="50000"/>
+            </a:schemeClr>
+          </a:lnRef>
+          <a:fillRef idx="1">
+            <a:schemeClr val="accent4"/>
+          </a:fillRef>
+          <a:effectRef idx="0">
+            <a:schemeClr val="accent4"/>
+          </a:effectRef>
+          <a:fontRef idx="minor">
+            <a:schemeClr val="lt1"/>
+          </a:fontRef>
+        </p:style>
+        <p:txBody>
+          <a:bodyPr rtlCol="0" anchor="ctr"/>
+          <a:lstStyle/>
+          <a:p>
+            <a:pPr algn="ctr"/>
+            <a:endParaRPr lang="LID4096"/>
+          </a:p>
+        </p:txBody>
+      </p:sp>
+      <p:sp>
+        <p:nvSpPr>
+          <p:cNvPr id="21" name="TextBox 20">
+            <a:extLst>
+              <a:ext uri="{FF2B5EF4-FFF2-40B4-BE49-F238E27FC236}">
+                <a16:creationId xmlns:a16="http://schemas.microsoft.com/office/drawing/2014/main" id="{9EB0AFC6-908D-4EF6-A3AD-0900A896408D}"/>
+              </a:ext>
+            </a:extLst>
+          </p:cNvPr>
+          <p:cNvSpPr txBox="1"/>
+          <p:nvPr/>
+        </p:nvSpPr>
+        <p:spPr>
+          <a:xfrm>
+            <a:off x="9559451" y="2235171"/>
+            <a:ext cx="1682189" cy="369332"/>
+          </a:xfrm>
+          <a:prstGeom prst="rect">
+            <a:avLst/>
+          </a:prstGeom>
+          <a:noFill/>
+        </p:spPr>
+        <p:txBody>
+          <a:bodyPr wrap="square" rtlCol="0">
+            <a:spAutoFit/>
+          </a:bodyPr>
+          <a:lstStyle/>
+          <a:p>
+            <a:r>
+              <a:rPr lang="en-US" dirty="0"/>
+              <a:t>User intent</a:t>
+            </a:r>
+          </a:p>
+        </p:txBody>
+      </p:sp>
+      <p:sp>
+        <p:nvSpPr>
+          <p:cNvPr id="22" name="Flowchart: Process 21">
+            <a:extLst>
+              <a:ext uri="{FF2B5EF4-FFF2-40B4-BE49-F238E27FC236}">
+                <a16:creationId xmlns:a16="http://schemas.microsoft.com/office/drawing/2014/main" id="{2CD0957E-9BFD-4248-B09A-4B69307473F3}"/>
+              </a:ext>
+            </a:extLst>
+          </p:cNvPr>
+          <p:cNvSpPr/>
+          <p:nvPr/>
+        </p:nvSpPr>
+        <p:spPr>
+          <a:xfrm>
+            <a:off x="1077987" y="3707033"/>
+            <a:ext cx="2457974" cy="485048"/>
+          </a:xfrm>
+          <a:prstGeom prst="flowChartProcess">
+            <a:avLst/>
+          </a:prstGeom>
+          <a:solidFill>
+            <a:srgbClr val="92D050"/>
+          </a:solidFill>
+        </p:spPr>
+        <p:style>
+          <a:lnRef idx="2">
+            <a:schemeClr val="accent1">
+              <a:shade val="50000"/>
+            </a:schemeClr>
+          </a:lnRef>
+          <a:fillRef idx="1">
+            <a:schemeClr val="accent1"/>
+          </a:fillRef>
+          <a:effectRef idx="0">
+            <a:schemeClr val="accent1"/>
+          </a:effectRef>
+          <a:fontRef idx="minor">
+            <a:schemeClr val="lt1"/>
+          </a:fontRef>
+        </p:style>
+        <p:txBody>
+          <a:bodyPr rtlCol="0" anchor="ctr"/>
+          <a:lstStyle/>
+          <a:p>
+            <a:pPr algn="ctr"/>
+            <a:r>
+              <a:rPr lang="en-US" dirty="0"/>
+              <a:t>“</a:t>
+            </a:r>
+            <a:r>
+              <a:rPr lang="en-US" dirty="0" err="1"/>
+              <a:t>Ik</a:t>
+            </a:r>
+            <a:r>
+              <a:rPr lang="en-US" dirty="0"/>
+              <a:t> </a:t>
+            </a:r>
+            <a:r>
+              <a:rPr lang="en-US" dirty="0" err="1"/>
+              <a:t>voel</a:t>
+            </a:r>
+            <a:r>
+              <a:rPr lang="en-US" dirty="0"/>
+              <a:t> me </a:t>
+            </a:r>
+            <a:r>
+              <a:rPr lang="en-US" dirty="0" err="1"/>
+              <a:t>ook</a:t>
+            </a:r>
+            <a:r>
+              <a:rPr lang="en-US" dirty="0"/>
+              <a:t> </a:t>
+            </a:r>
+            <a:r>
+              <a:rPr lang="en-US" dirty="0" err="1"/>
+              <a:t>goed</a:t>
+            </a:r>
+            <a:r>
+              <a:rPr lang="en-US" dirty="0"/>
+              <a:t>.”</a:t>
+            </a:r>
+            <a:endParaRPr lang="LID4096" dirty="0"/>
+          </a:p>
+        </p:txBody>
+      </p:sp>
+      <p:sp>
+        <p:nvSpPr>
+          <p:cNvPr id="23" name="Flowchart: Process 22">
+            <a:extLst>
+              <a:ext uri="{FF2B5EF4-FFF2-40B4-BE49-F238E27FC236}">
+                <a16:creationId xmlns:a16="http://schemas.microsoft.com/office/drawing/2014/main" id="{D2C27903-CE25-4461-9524-81179D58B65E}"/>
+              </a:ext>
+            </a:extLst>
+          </p:cNvPr>
+          <p:cNvSpPr/>
+          <p:nvPr/>
+        </p:nvSpPr>
+        <p:spPr>
+          <a:xfrm>
+            <a:off x="1077987" y="4420608"/>
+            <a:ext cx="2457974" cy="485048"/>
+          </a:xfrm>
+          <a:prstGeom prst="flowChartProcess">
+            <a:avLst/>
+          </a:prstGeom>
+        </p:spPr>
+        <p:style>
+          <a:lnRef idx="2">
+            <a:schemeClr val="accent4">
+              <a:shade val="50000"/>
+            </a:schemeClr>
+          </a:lnRef>
+          <a:fillRef idx="1">
+            <a:schemeClr val="accent4"/>
+          </a:fillRef>
+          <a:effectRef idx="0">
+            <a:schemeClr val="accent4"/>
+          </a:effectRef>
+          <a:fontRef idx="minor">
+            <a:schemeClr val="lt1"/>
+          </a:fontRef>
+        </p:style>
+        <p:txBody>
+          <a:bodyPr rtlCol="0" anchor="ctr"/>
+          <a:lstStyle/>
+          <a:p>
+            <a:pPr algn="ctr"/>
+            <a:r>
+              <a:rPr lang="en-US" i="1" dirty="0" err="1"/>
+              <a:t>positive_mood</a:t>
+            </a:r>
+            <a:endParaRPr lang="LID4096" i="1" dirty="0"/>
+          </a:p>
+        </p:txBody>
+      </p:sp>
+      <p:sp>
+        <p:nvSpPr>
+          <p:cNvPr id="24" name="Flowchart: Process 23">
+            <a:extLst>
+              <a:ext uri="{FF2B5EF4-FFF2-40B4-BE49-F238E27FC236}">
+                <a16:creationId xmlns:a16="http://schemas.microsoft.com/office/drawing/2014/main" id="{FB4B1F4E-D9DE-4C7E-91FF-6F9EBD3E09B1}"/>
+              </a:ext>
+            </a:extLst>
+          </p:cNvPr>
+          <p:cNvSpPr/>
+          <p:nvPr/>
+        </p:nvSpPr>
+        <p:spPr>
+          <a:xfrm>
+            <a:off x="1077987" y="5134182"/>
+            <a:ext cx="2457974" cy="603887"/>
+          </a:xfrm>
+          <a:prstGeom prst="flowChartProcess">
+            <a:avLst/>
+          </a:prstGeom>
+        </p:spPr>
+        <p:style>
+          <a:lnRef idx="2">
+            <a:schemeClr val="accent1">
+              <a:shade val="50000"/>
+            </a:schemeClr>
+          </a:lnRef>
+          <a:fillRef idx="1">
+            <a:schemeClr val="accent1"/>
+          </a:fillRef>
+          <a:effectRef idx="0">
+            <a:schemeClr val="accent1"/>
+          </a:effectRef>
+          <a:fontRef idx="minor">
+            <a:schemeClr val="lt1"/>
+          </a:fontRef>
+        </p:style>
+        <p:txBody>
+          <a:bodyPr rtlCol="0" anchor="ctr"/>
+          <a:lstStyle/>
+          <a:p>
+            <a:pPr algn="ctr"/>
+            <a:r>
+              <a:rPr lang="en-US" dirty="0"/>
+              <a:t>“</a:t>
+            </a:r>
+            <a:r>
+              <a:rPr lang="en-US" dirty="0" err="1"/>
+              <a:t>Ik</a:t>
+            </a:r>
+            <a:r>
+              <a:rPr lang="en-US" dirty="0"/>
+              <a:t> ben </a:t>
+            </a:r>
+            <a:r>
+              <a:rPr lang="en-US" dirty="0" err="1"/>
+              <a:t>blij</a:t>
+            </a:r>
+            <a:r>
+              <a:rPr lang="en-US" dirty="0"/>
+              <a:t> </a:t>
+            </a:r>
+            <a:r>
+              <a:rPr lang="en-US" dirty="0" err="1"/>
+              <a:t>dat</a:t>
+            </a:r>
+            <a:r>
+              <a:rPr lang="en-US" dirty="0"/>
+              <a:t> </a:t>
+            </a:r>
+            <a:r>
+              <a:rPr lang="en-US" dirty="0" err="1"/>
+              <a:t>te</a:t>
+            </a:r>
+            <a:r>
+              <a:rPr lang="en-US" dirty="0"/>
+              <a:t> </a:t>
+            </a:r>
+            <a:r>
+              <a:rPr lang="en-US" dirty="0" err="1"/>
+              <a:t>horen</a:t>
+            </a:r>
+            <a:r>
+              <a:rPr lang="en-US" dirty="0"/>
+              <a:t>!”</a:t>
+            </a:r>
+            <a:endParaRPr lang="LID4096" dirty="0"/>
+          </a:p>
+        </p:txBody>
+      </p:sp>
+      <p:sp>
+        <p:nvSpPr>
+          <p:cNvPr id="25" name="Flowchart: Process 24">
+            <a:extLst>
+              <a:ext uri="{FF2B5EF4-FFF2-40B4-BE49-F238E27FC236}">
+                <a16:creationId xmlns:a16="http://schemas.microsoft.com/office/drawing/2014/main" id="{03401160-59AE-4761-8672-CDE6DCD5FB02}"/>
+              </a:ext>
+            </a:extLst>
+          </p:cNvPr>
+          <p:cNvSpPr/>
+          <p:nvPr/>
+        </p:nvSpPr>
+        <p:spPr>
+          <a:xfrm>
+            <a:off x="5993935" y="3707033"/>
+            <a:ext cx="2457974" cy="485048"/>
+          </a:xfrm>
+          <a:prstGeom prst="flowChartProcess">
+            <a:avLst/>
+          </a:prstGeom>
+          <a:solidFill>
+            <a:srgbClr val="92D050"/>
+          </a:solidFill>
+        </p:spPr>
+        <p:style>
+          <a:lnRef idx="2">
+            <a:schemeClr val="accent1">
+              <a:shade val="50000"/>
+            </a:schemeClr>
+          </a:lnRef>
+          <a:fillRef idx="1">
+            <a:schemeClr val="accent1"/>
+          </a:fillRef>
+          <a:effectRef idx="0">
+            <a:schemeClr val="accent1"/>
+          </a:effectRef>
+          <a:fontRef idx="minor">
+            <a:schemeClr val="lt1"/>
+          </a:fontRef>
+        </p:style>
+        <p:txBody>
+          <a:bodyPr rtlCol="0" anchor="ctr"/>
+          <a:lstStyle/>
+          <a:p>
+            <a:pPr algn="ctr"/>
+            <a:r>
+              <a:rPr lang="en-US" dirty="0"/>
+              <a:t>“</a:t>
+            </a:r>
+            <a:r>
+              <a:rPr lang="en-US" dirty="0" err="1"/>
+              <a:t>Niet</a:t>
+            </a:r>
+            <a:r>
+              <a:rPr lang="en-US" dirty="0"/>
+              <a:t> zo </a:t>
+            </a:r>
+            <a:r>
+              <a:rPr lang="en-US" dirty="0" err="1"/>
+              <a:t>goed</a:t>
+            </a:r>
+            <a:r>
+              <a:rPr lang="en-US" dirty="0"/>
+              <a:t>.”</a:t>
+            </a:r>
+            <a:endParaRPr lang="LID4096" dirty="0"/>
+          </a:p>
+        </p:txBody>
+      </p:sp>
+      <p:sp>
+        <p:nvSpPr>
+          <p:cNvPr id="26" name="Flowchart: Process 25">
+            <a:extLst>
+              <a:ext uri="{FF2B5EF4-FFF2-40B4-BE49-F238E27FC236}">
+                <a16:creationId xmlns:a16="http://schemas.microsoft.com/office/drawing/2014/main" id="{73723624-0F11-4785-830F-209F8A064A15}"/>
+              </a:ext>
+            </a:extLst>
+          </p:cNvPr>
+          <p:cNvSpPr/>
+          <p:nvPr/>
+        </p:nvSpPr>
+        <p:spPr>
+          <a:xfrm>
+            <a:off x="5993935" y="4420608"/>
+            <a:ext cx="2457974" cy="485048"/>
+          </a:xfrm>
+          <a:prstGeom prst="flowChartProcess">
+            <a:avLst/>
+          </a:prstGeom>
+        </p:spPr>
+        <p:style>
+          <a:lnRef idx="2">
+            <a:schemeClr val="accent4">
+              <a:shade val="50000"/>
+            </a:schemeClr>
+          </a:lnRef>
+          <a:fillRef idx="1">
+            <a:schemeClr val="accent4"/>
+          </a:fillRef>
+          <a:effectRef idx="0">
+            <a:schemeClr val="accent4"/>
+          </a:effectRef>
+          <a:fontRef idx="minor">
+            <a:schemeClr val="lt1"/>
+          </a:fontRef>
+        </p:style>
+        <p:txBody>
+          <a:bodyPr rtlCol="0" anchor="ctr"/>
+          <a:lstStyle/>
+          <a:p>
+            <a:pPr algn="ctr"/>
+            <a:r>
+              <a:rPr lang="en-US" i="1" dirty="0" err="1"/>
+              <a:t>negative_mood</a:t>
+            </a:r>
+            <a:endParaRPr lang="LID4096" i="1" dirty="0"/>
+          </a:p>
+        </p:txBody>
+      </p:sp>
+      <p:sp>
+        <p:nvSpPr>
+          <p:cNvPr id="27" name="Flowchart: Process 26">
+            <a:extLst>
+              <a:ext uri="{FF2B5EF4-FFF2-40B4-BE49-F238E27FC236}">
+                <a16:creationId xmlns:a16="http://schemas.microsoft.com/office/drawing/2014/main" id="{01EEFA16-C996-4576-964B-46188A7B4ACA}"/>
+              </a:ext>
+            </a:extLst>
+          </p:cNvPr>
+          <p:cNvSpPr/>
+          <p:nvPr/>
+        </p:nvSpPr>
+        <p:spPr>
+          <a:xfrm>
+            <a:off x="5993935" y="5134182"/>
+            <a:ext cx="2457974" cy="903852"/>
+          </a:xfrm>
+          <a:prstGeom prst="flowChartProcess">
+            <a:avLst/>
+          </a:prstGeom>
+        </p:spPr>
+        <p:style>
+          <a:lnRef idx="2">
+            <a:schemeClr val="accent1">
+              <a:shade val="50000"/>
+            </a:schemeClr>
+          </a:lnRef>
+          <a:fillRef idx="1">
+            <a:schemeClr val="accent1"/>
+          </a:fillRef>
+          <a:effectRef idx="0">
+            <a:schemeClr val="accent1"/>
+          </a:effectRef>
+          <a:fontRef idx="minor">
+            <a:schemeClr val="lt1"/>
+          </a:fontRef>
+        </p:style>
+        <p:txBody>
+          <a:bodyPr rtlCol="0" anchor="ctr"/>
+          <a:lstStyle/>
+          <a:p>
+            <a:pPr algn="ctr"/>
+            <a:r>
+              <a:rPr lang="en-US" dirty="0"/>
+              <a:t>“Aww het </a:t>
+            </a:r>
+            <a:r>
+              <a:rPr lang="en-US" dirty="0" err="1"/>
+              <a:t>spijt</a:t>
+            </a:r>
+            <a:r>
+              <a:rPr lang="en-US" dirty="0"/>
+              <a:t> me.</a:t>
+            </a:r>
+            <a:r>
+              <a:rPr lang="nl-NL" dirty="0"/>
+              <a:t> Ik hoop dat je je snel beter voelt.</a:t>
+            </a:r>
+            <a:r>
+              <a:rPr lang="en-US" dirty="0"/>
+              <a:t>”</a:t>
+            </a:r>
+            <a:endParaRPr lang="LID4096" dirty="0"/>
+          </a:p>
+        </p:txBody>
+      </p:sp>
+      <p:cxnSp>
+        <p:nvCxnSpPr>
+          <p:cNvPr id="28" name="Straight Arrow Connector 27">
+            <a:extLst>
+              <a:ext uri="{FF2B5EF4-FFF2-40B4-BE49-F238E27FC236}">
+                <a16:creationId xmlns:a16="http://schemas.microsoft.com/office/drawing/2014/main" id="{4143E766-841F-4B3B-812A-634ACF017134}"/>
+              </a:ext>
+            </a:extLst>
+          </p:cNvPr>
+          <p:cNvCxnSpPr>
+            <a:cxnSpLocks/>
+            <a:stCxn id="8" idx="2"/>
+            <a:endCxn id="10" idx="0"/>
+          </p:cNvCxnSpPr>
+          <p:nvPr/>
+        </p:nvCxnSpPr>
+        <p:spPr>
+          <a:xfrm>
+            <a:off x="4764948" y="2437393"/>
+            <a:ext cx="0" cy="228527"/>
+          </a:xfrm>
+          <a:prstGeom prst="straightConnector1">
+            <a:avLst/>
+          </a:prstGeom>
+          <a:ln w="38100">
+            <a:solidFill>
+              <a:schemeClr val="tx1"/>
+            </a:solidFill>
+            <a:tailEnd type="triangle"/>
+          </a:ln>
+        </p:spPr>
+        <p:style>
+          <a:lnRef idx="1">
+            <a:schemeClr val="accent1"/>
+          </a:lnRef>
+          <a:fillRef idx="0">
+            <a:schemeClr val="accent1"/>
+          </a:fillRef>
+          <a:effectRef idx="0">
+            <a:schemeClr val="accent1"/>
+          </a:effectRef>
+          <a:fontRef idx="minor">
+            <a:schemeClr val="tx1"/>
+          </a:fontRef>
+        </p:style>
+      </p:cxnSp>
+      <p:cxnSp>
+        <p:nvCxnSpPr>
+          <p:cNvPr id="31" name="Straight Arrow Connector 30">
+            <a:extLst>
+              <a:ext uri="{FF2B5EF4-FFF2-40B4-BE49-F238E27FC236}">
+                <a16:creationId xmlns:a16="http://schemas.microsoft.com/office/drawing/2014/main" id="{1B087049-4129-437A-93DD-030DF5EEBA51}"/>
+              </a:ext>
+            </a:extLst>
+          </p:cNvPr>
+          <p:cNvCxnSpPr>
+            <a:cxnSpLocks/>
+            <a:stCxn id="10" idx="2"/>
+            <a:endCxn id="22" idx="0"/>
+          </p:cNvCxnSpPr>
+          <p:nvPr/>
+        </p:nvCxnSpPr>
+        <p:spPr>
+          <a:xfrm flipH="1">
+            <a:off x="2306974" y="3150968"/>
+            <a:ext cx="2457974" cy="556065"/>
+          </a:xfrm>
+          <a:prstGeom prst="straightConnector1">
+            <a:avLst/>
+          </a:prstGeom>
+          <a:ln w="38100">
+            <a:solidFill>
+              <a:schemeClr val="tx1"/>
+            </a:solidFill>
+            <a:tailEnd type="triangle"/>
+          </a:ln>
+        </p:spPr>
+        <p:style>
+          <a:lnRef idx="1">
+            <a:schemeClr val="accent1"/>
+          </a:lnRef>
+          <a:fillRef idx="0">
+            <a:schemeClr val="accent1"/>
+          </a:fillRef>
+          <a:effectRef idx="0">
+            <a:schemeClr val="accent1"/>
+          </a:effectRef>
+          <a:fontRef idx="minor">
+            <a:schemeClr val="tx1"/>
+          </a:fontRef>
+        </p:style>
+      </p:cxnSp>
+      <p:cxnSp>
+        <p:nvCxnSpPr>
+          <p:cNvPr id="34" name="Straight Arrow Connector 33">
+            <a:extLst>
+              <a:ext uri="{FF2B5EF4-FFF2-40B4-BE49-F238E27FC236}">
+                <a16:creationId xmlns:a16="http://schemas.microsoft.com/office/drawing/2014/main" id="{3B0362DD-4769-4E3F-9429-A56AE5087614}"/>
+              </a:ext>
+            </a:extLst>
+          </p:cNvPr>
+          <p:cNvCxnSpPr>
+            <a:cxnSpLocks/>
+            <a:stCxn id="10" idx="2"/>
+            <a:endCxn id="25" idx="0"/>
+          </p:cNvCxnSpPr>
+          <p:nvPr/>
+        </p:nvCxnSpPr>
+        <p:spPr>
+          <a:xfrm>
+            <a:off x="4764948" y="3150968"/>
+            <a:ext cx="2457974" cy="556065"/>
+          </a:xfrm>
+          <a:prstGeom prst="straightConnector1">
+            <a:avLst/>
+          </a:prstGeom>
+          <a:ln w="38100">
+            <a:solidFill>
+              <a:schemeClr val="tx1"/>
+            </a:solidFill>
+            <a:tailEnd type="triangle"/>
+          </a:ln>
+        </p:spPr>
+        <p:style>
+          <a:lnRef idx="1">
+            <a:schemeClr val="accent1"/>
+          </a:lnRef>
+          <a:fillRef idx="0">
+            <a:schemeClr val="accent1"/>
+          </a:fillRef>
+          <a:effectRef idx="0">
+            <a:schemeClr val="accent1"/>
+          </a:effectRef>
+          <a:fontRef idx="minor">
+            <a:schemeClr val="tx1"/>
+          </a:fontRef>
+        </p:style>
+      </p:cxnSp>
+      <p:cxnSp>
+        <p:nvCxnSpPr>
+          <p:cNvPr id="37" name="Straight Arrow Connector 36">
+            <a:extLst>
+              <a:ext uri="{FF2B5EF4-FFF2-40B4-BE49-F238E27FC236}">
+                <a16:creationId xmlns:a16="http://schemas.microsoft.com/office/drawing/2014/main" id="{BD3A6515-3C6D-4DCD-90BA-DE9B5B898F1C}"/>
+              </a:ext>
+            </a:extLst>
+          </p:cNvPr>
+          <p:cNvCxnSpPr>
+            <a:cxnSpLocks/>
+            <a:stCxn id="25" idx="2"/>
+            <a:endCxn id="26" idx="0"/>
+          </p:cNvCxnSpPr>
+          <p:nvPr/>
+        </p:nvCxnSpPr>
+        <p:spPr>
+          <a:xfrm>
+            <a:off x="7222922" y="4192081"/>
+            <a:ext cx="0" cy="228527"/>
+          </a:xfrm>
+          <a:prstGeom prst="straightConnector1">
+            <a:avLst/>
+          </a:prstGeom>
+          <a:ln w="38100">
+            <a:solidFill>
+              <a:schemeClr val="tx1"/>
+            </a:solidFill>
+            <a:tailEnd type="triangle"/>
+          </a:ln>
+        </p:spPr>
+        <p:style>
+          <a:lnRef idx="1">
+            <a:schemeClr val="accent1"/>
+          </a:lnRef>
+          <a:fillRef idx="0">
+            <a:schemeClr val="accent1"/>
+          </a:fillRef>
+          <a:effectRef idx="0">
+            <a:schemeClr val="accent1"/>
+          </a:effectRef>
+          <a:fontRef idx="minor">
+            <a:schemeClr val="tx1"/>
+          </a:fontRef>
+        </p:style>
+      </p:cxnSp>
+      <p:cxnSp>
+        <p:nvCxnSpPr>
+          <p:cNvPr id="40" name="Straight Arrow Connector 39">
+            <a:extLst>
+              <a:ext uri="{FF2B5EF4-FFF2-40B4-BE49-F238E27FC236}">
+                <a16:creationId xmlns:a16="http://schemas.microsoft.com/office/drawing/2014/main" id="{58246704-5E9B-4B5C-9026-06461A35EA7D}"/>
+              </a:ext>
+            </a:extLst>
+          </p:cNvPr>
+          <p:cNvCxnSpPr>
+            <a:cxnSpLocks/>
+            <a:stCxn id="26" idx="2"/>
+            <a:endCxn id="27" idx="0"/>
+          </p:cNvCxnSpPr>
+          <p:nvPr/>
+        </p:nvCxnSpPr>
+        <p:spPr>
+          <a:xfrm>
+            <a:off x="7222922" y="4905656"/>
+            <a:ext cx="0" cy="228526"/>
+          </a:xfrm>
+          <a:prstGeom prst="straightConnector1">
+            <a:avLst/>
+          </a:prstGeom>
+          <a:ln w="38100">
+            <a:solidFill>
+              <a:schemeClr val="tx1"/>
+            </a:solidFill>
+            <a:tailEnd type="triangle"/>
+          </a:ln>
+        </p:spPr>
+        <p:style>
+          <a:lnRef idx="1">
+            <a:schemeClr val="accent1"/>
+          </a:lnRef>
+          <a:fillRef idx="0">
+            <a:schemeClr val="accent1"/>
+          </a:fillRef>
+          <a:effectRef idx="0">
+            <a:schemeClr val="accent1"/>
+          </a:effectRef>
+          <a:fontRef idx="minor">
+            <a:schemeClr val="tx1"/>
+          </a:fontRef>
+        </p:style>
+      </p:cxnSp>
+      <p:cxnSp>
+        <p:nvCxnSpPr>
+          <p:cNvPr id="43" name="Straight Arrow Connector 42">
+            <a:extLst>
+              <a:ext uri="{FF2B5EF4-FFF2-40B4-BE49-F238E27FC236}">
+                <a16:creationId xmlns:a16="http://schemas.microsoft.com/office/drawing/2014/main" id="{07D0EAF0-D044-4D04-B7EE-68F54ACA3553}"/>
+              </a:ext>
+            </a:extLst>
+          </p:cNvPr>
+          <p:cNvCxnSpPr>
+            <a:cxnSpLocks/>
+            <a:stCxn id="22" idx="2"/>
+            <a:endCxn id="23" idx="0"/>
+          </p:cNvCxnSpPr>
+          <p:nvPr/>
+        </p:nvCxnSpPr>
+        <p:spPr>
+          <a:xfrm>
+            <a:off x="2306974" y="4192081"/>
+            <a:ext cx="0" cy="228527"/>
+          </a:xfrm>
+          <a:prstGeom prst="straightConnector1">
+            <a:avLst/>
+          </a:prstGeom>
+          <a:ln w="38100">
+            <a:solidFill>
+              <a:schemeClr val="tx1"/>
+            </a:solidFill>
+            <a:tailEnd type="triangle"/>
+          </a:ln>
+        </p:spPr>
+        <p:style>
+          <a:lnRef idx="1">
+            <a:schemeClr val="accent1"/>
+          </a:lnRef>
+          <a:fillRef idx="0">
+            <a:schemeClr val="accent1"/>
+          </a:fillRef>
+          <a:effectRef idx="0">
+            <a:schemeClr val="accent1"/>
+          </a:effectRef>
+          <a:fontRef idx="minor">
+            <a:schemeClr val="tx1"/>
+          </a:fontRef>
+        </p:style>
+      </p:cxnSp>
+      <p:cxnSp>
+        <p:nvCxnSpPr>
+          <p:cNvPr id="46" name="Straight Arrow Connector 45">
+            <a:extLst>
+              <a:ext uri="{FF2B5EF4-FFF2-40B4-BE49-F238E27FC236}">
+                <a16:creationId xmlns:a16="http://schemas.microsoft.com/office/drawing/2014/main" id="{763F839D-140E-4B90-A746-166081BFBF2F}"/>
+              </a:ext>
+            </a:extLst>
+          </p:cNvPr>
+          <p:cNvCxnSpPr>
+            <a:cxnSpLocks/>
+            <a:stCxn id="23" idx="2"/>
+            <a:endCxn id="24" idx="0"/>
+          </p:cNvCxnSpPr>
+          <p:nvPr/>
+        </p:nvCxnSpPr>
+        <p:spPr>
+          <a:xfrm>
+            <a:off x="2306974" y="4905656"/>
+            <a:ext cx="0" cy="228526"/>
+          </a:xfrm>
+          <a:prstGeom prst="straightConnector1">
+            <a:avLst/>
+          </a:prstGeom>
+          <a:ln w="38100">
+            <a:solidFill>
+              <a:schemeClr val="tx1"/>
+            </a:solidFill>
+            <a:tailEnd type="triangle"/>
+          </a:ln>
+        </p:spPr>
+        <p:style>
+          <a:lnRef idx="1">
+            <a:schemeClr val="accent1"/>
+          </a:lnRef>
+          <a:fillRef idx="0">
+            <a:schemeClr val="accent1"/>
+          </a:fillRef>
+          <a:effectRef idx="0">
+            <a:schemeClr val="accent1"/>
+          </a:effectRef>
+          <a:fontRef idx="minor">
+            <a:schemeClr val="tx1"/>
+          </a:fontRef>
+        </p:style>
+      </p:cxnSp>
+    </p:spTree>
+    <p:extLst>
+      <p:ext uri="{BB962C8B-B14F-4D97-AF65-F5344CB8AC3E}">
+        <p14:creationId xmlns:p14="http://schemas.microsoft.com/office/powerpoint/2010/main" val="1302696403"/>
       </p:ext>
     </p:extLst>
   </p:cSld>

</xml_diff>